<commit_message>
refreshed module for FY2019Q1
- verified labs steps work
- fixed typo links in readme
</commit_message>
<xml_diff>
--- a/OfficeAddin/01 Building Add-ins for Microsoft Word/01 Text and Formatting in Word Add-ins.pptx
+++ b/OfficeAddin/01 Building Add-ins for Microsoft Word/01 Text and Formatting in Word Add-ins.pptx
@@ -271,7 +271,7 @@
               <a:rPr lang="en-US" smtClean="0">
                 <a:latin typeface="Segoe UI" pitchFamily="34" charset="0"/>
               </a:rPr>
-              <a:t>6/8/18 1:47 PM</a:t>
+              <a:t>9/17/18 3:30 PM</a:t>
             </a:fld>
             <a:endParaRPr lang="en-US" dirty="0">
               <a:latin typeface="Segoe UI" pitchFamily="34" charset="0"/>
@@ -565,7 +565,7 @@
           <a:p>
             <a:fld id="{D18B56EA-E28F-4F92-9F16-7A6F2501B303}" type="datetime8">
               <a:rPr lang="en-US" smtClean="0"/>
-              <a:t>6/8/18 1:47 PM</a:t>
+              <a:t>9/17/18 3:30 PM</a:t>
             </a:fld>
             <a:endParaRPr lang="en-US" dirty="0"/>
           </a:p>
@@ -1053,7 +1053,7 @@
                 <a:tabLst/>
                 <a:defRPr/>
               </a:pPr>
-              <a:t>6/8/18 1:47 PM</a:t>
+              <a:t>9/17/18 3:30 PM</a:t>
             </a:fld>
             <a:endParaRPr kumimoji="0" lang="en-US" sz="1200" b="0" i="0" u="none" strike="noStrike" kern="1200" cap="none" spc="0" normalizeH="0" baseline="0" noProof="0" dirty="0">
               <a:ln>
@@ -1446,7 +1446,7 @@
                 <a:tabLst/>
                 <a:defRPr/>
               </a:pPr>
-              <a:t>6/8/18 1:47 PM</a:t>
+              <a:t>9/17/18 3:30 PM</a:t>
             </a:fld>
             <a:endParaRPr kumimoji="0" lang="en-US" sz="1200" b="0" i="0" u="none" strike="noStrike" kern="1200" cap="none" spc="0" normalizeH="0" baseline="0" noProof="0" dirty="0">
               <a:ln>
@@ -1752,7 +1752,7 @@
           <a:p>
             <a:fld id="{D18B56EA-E28F-4F92-9F16-7A6F2501B303}" type="datetime8">
               <a:rPr lang="en-US" smtClean="0"/>
-              <a:t>6/8/18 1:47 PM</a:t>
+              <a:t>9/17/18 3:30 PM</a:t>
             </a:fld>
             <a:endParaRPr lang="en-US" dirty="0"/>
           </a:p>
@@ -2943,7 +2943,7 @@
           <a:p>
             <a:fld id="{D18B56EA-E28F-4F92-9F16-7A6F2501B303}" type="datetime8">
               <a:rPr lang="en-US" smtClean="0"/>
-              <a:t>6/8/18 1:47 PM</a:t>
+              <a:t>9/17/18 3:30 PM</a:t>
             </a:fld>
             <a:endParaRPr lang="en-US" dirty="0"/>
           </a:p>
@@ -3124,7 +3124,7 @@
           <a:p>
             <a:fld id="{D18B56EA-E28F-4F92-9F16-7A6F2501B303}" type="datetime8">
               <a:rPr lang="en-US" smtClean="0"/>
-              <a:t>6/8/18 1:47 PM</a:t>
+              <a:t>9/17/18 3:30 PM</a:t>
             </a:fld>
             <a:endParaRPr lang="en-US" dirty="0"/>
           </a:p>
@@ -3305,7 +3305,7 @@
           <a:p>
             <a:fld id="{D18B56EA-E28F-4F92-9F16-7A6F2501B303}" type="datetime8">
               <a:rPr lang="en-US" smtClean="0"/>
-              <a:t>6/8/18 1:47 PM</a:t>
+              <a:t>9/17/18 3:30 PM</a:t>
             </a:fld>
             <a:endParaRPr lang="en-US" dirty="0"/>
           </a:p>
@@ -3486,7 +3486,7 @@
           <a:p>
             <a:fld id="{D18B56EA-E28F-4F92-9F16-7A6F2501B303}" type="datetime8">
               <a:rPr lang="en-US" smtClean="0"/>
-              <a:t>6/8/18 1:47 PM</a:t>
+              <a:t>9/17/18 3:30 PM</a:t>
             </a:fld>
             <a:endParaRPr lang="en-US" dirty="0"/>
           </a:p>
@@ -3772,7 +3772,7 @@
                 <a:tabLst/>
                 <a:defRPr/>
               </a:pPr>
-              <a:t>6/8/18 1:47 PM</a:t>
+              <a:t>9/17/18 3:30 PM</a:t>
             </a:fld>
             <a:endParaRPr kumimoji="0" lang="en-US" sz="1200" b="0" i="0" u="none" strike="noStrike" kern="1200" cap="none" spc="0" normalizeH="0" baseline="0" noProof="0" dirty="0">
               <a:ln>
@@ -4289,7 +4289,7 @@
           <a:p>
             <a:fld id="{D18B56EA-E28F-4F92-9F16-7A6F2501B303}" type="datetime8">
               <a:rPr lang="en-US" smtClean="0"/>
-              <a:t>6/8/18 1:47 PM</a:t>
+              <a:t>9/17/18 3:30 PM</a:t>
             </a:fld>
             <a:endParaRPr lang="en-US" dirty="0"/>
           </a:p>
@@ -4657,7 +4657,7 @@
                 <a:tabLst/>
                 <a:defRPr/>
               </a:pPr>
-              <a:t>6/8/18 1:47 PM</a:t>
+              <a:t>9/17/18 3:30 PM</a:t>
             </a:fld>
             <a:endParaRPr kumimoji="0" lang="en-US" sz="1200" b="0" i="0" u="none" strike="noStrike" kern="1200" cap="none" spc="0" normalizeH="0" baseline="0" noProof="0" dirty="0">
               <a:ln>
@@ -4953,7 +4953,7 @@
           <a:p>
             <a:fld id="{D18B56EA-E28F-4F92-9F16-7A6F2501B303}" type="datetime8">
               <a:rPr lang="en-US" smtClean="0"/>
-              <a:t>6/8/18 1:47 PM</a:t>
+              <a:t>9/17/18 3:30 PM</a:t>
             </a:fld>
             <a:endParaRPr lang="en-US" dirty="0"/>
           </a:p>
@@ -5161,7 +5161,7 @@
           <a:p>
             <a:fld id="{D18B56EA-E28F-4F92-9F16-7A6F2501B303}" type="datetime8">
               <a:rPr lang="en-US" smtClean="0"/>
-              <a:t>6/8/18 1:47 PM</a:t>
+              <a:t>9/17/18 3:30 PM</a:t>
             </a:fld>
             <a:endParaRPr lang="en-US" dirty="0"/>
           </a:p>
@@ -5496,7 +5496,7 @@
                 <a:tabLst/>
                 <a:defRPr/>
               </a:pPr>
-              <a:t>6/8/18 1:47 PM</a:t>
+              <a:t>9/17/18 3:30 PM</a:t>
             </a:fld>
             <a:endParaRPr kumimoji="0" lang="en-US" sz="1200" b="0" i="0" u="none" strike="noStrike" kern="1200" cap="none" spc="0" normalizeH="0" baseline="0" noProof="0" dirty="0">
               <a:ln>
@@ -5794,7 +5794,7 @@
           <a:p>
             <a:fld id="{D18B56EA-E28F-4F92-9F16-7A6F2501B303}" type="datetime8">
               <a:rPr lang="en-US" smtClean="0"/>
-              <a:t>6/8/18 1:47 PM</a:t>
+              <a:t>9/17/18 3:30 PM</a:t>
             </a:fld>
             <a:endParaRPr lang="en-US" dirty="0"/>
           </a:p>
@@ -19010,12 +19010,12 @@
               <a:buSzTx/>
             </a:pPr>
             <a:r>
-              <a:rPr lang="en-US" sz="1600" dirty="0">
+              <a:rPr lang="en-US" sz="1800" dirty="0">
                 <a:hlinkClick r:id="rId6"/>
               </a:rPr>
               <a:t>https://dev.office.com/reference/add-ins/word/paragraph</a:t>
             </a:r>
-            <a:endParaRPr lang="en-US" sz="1600" dirty="0"/>
+            <a:endParaRPr lang="en-US" sz="1800" dirty="0"/>
           </a:p>
           <a:p>
             <a:pPr marL="342900" indent="-342900" defTabSz="914400">
@@ -25141,7 +25141,7 @@
         <p159:morph option="byObject"/>
       </p:transition>
     </mc:Choice>
-    <mc:Fallback xmlns="" xmlns:a14="http://schemas.microsoft.com/office/drawing/2010/main" xmlns:p14="http://schemas.microsoft.com/office/powerpoint/2010/main">
+    <mc:Fallback xmlns:p14="http://schemas.microsoft.com/office/powerpoint/2010/main" xmlns:a14="http://schemas.microsoft.com/office/drawing/2010/main" xmlns="">
       <p:transition spd="slow">
         <p:fade/>
       </p:transition>
@@ -33232,7 +33232,7 @@
                 </a:solidFill>
                 <a:latin typeface="Segoe UI Semibold"/>
               </a:rPr>
-              <a:t>Similar to styles, fonts can be applied to an entire paragraph or range of text.</a:t>
+              <a:t>Like styles, fonts can be applied to an entire paragraph or range of text.</a:t>
             </a:r>
           </a:p>
           <a:p>

</xml_diff>

<commit_message>
OfficeAddins - Module 1: FY2019Q3 Quarterly refresh  (#574)
* fy19q3 quarterly refresh

- added copyright to edited files
- updated slides & code samples to work against all current deps

* addressing reviewer feedback

- cleaned up copyright comment
</commit_message>
<xml_diff>
--- a/OfficeAddin/01 Building Add-ins for Microsoft Word/01 Text and Formatting in Word Add-ins.pptx
+++ b/OfficeAddin/01 Building Add-ins for Microsoft Word/01 Text and Formatting in Word Add-ins.pptx
@@ -271,7 +271,7 @@
               <a:rPr lang="en-US" smtClean="0">
                 <a:latin typeface="Segoe UI" pitchFamily="34" charset="0"/>
               </a:rPr>
-              <a:t>9/17/18 3:30 PM</a:t>
+              <a:t>3/4/19 8:29 PM</a:t>
             </a:fld>
             <a:endParaRPr lang="en-US" dirty="0">
               <a:latin typeface="Segoe UI" pitchFamily="34" charset="0"/>
@@ -565,7 +565,7 @@
           <a:p>
             <a:fld id="{D18B56EA-E28F-4F92-9F16-7A6F2501B303}" type="datetime8">
               <a:rPr lang="en-US" smtClean="0"/>
-              <a:t>9/17/18 3:30 PM</a:t>
+              <a:t>3/4/19 8:28 PM</a:t>
             </a:fld>
             <a:endParaRPr lang="en-US" dirty="0"/>
           </a:p>
@@ -1053,7 +1053,7 @@
                 <a:tabLst/>
                 <a:defRPr/>
               </a:pPr>
-              <a:t>9/17/18 3:30 PM</a:t>
+              <a:t>3/4/19 8:28 PM</a:t>
             </a:fld>
             <a:endParaRPr kumimoji="0" lang="en-US" sz="1200" b="0" i="0" u="none" strike="noStrike" kern="1200" cap="none" spc="0" normalizeH="0" baseline="0" noProof="0" dirty="0">
               <a:ln>
@@ -1446,7 +1446,7 @@
                 <a:tabLst/>
                 <a:defRPr/>
               </a:pPr>
-              <a:t>9/17/18 3:30 PM</a:t>
+              <a:t>3/4/19 8:29 PM</a:t>
             </a:fld>
             <a:endParaRPr kumimoji="0" lang="en-US" sz="1200" b="0" i="0" u="none" strike="noStrike" kern="1200" cap="none" spc="0" normalizeH="0" baseline="0" noProof="0" dirty="0">
               <a:ln>
@@ -1752,7 +1752,7 @@
           <a:p>
             <a:fld id="{D18B56EA-E28F-4F92-9F16-7A6F2501B303}" type="datetime8">
               <a:rPr lang="en-US" smtClean="0"/>
-              <a:t>9/17/18 3:30 PM</a:t>
+              <a:t>3/4/19 8:29 PM</a:t>
             </a:fld>
             <a:endParaRPr lang="en-US" dirty="0"/>
           </a:p>
@@ -2943,7 +2943,7 @@
           <a:p>
             <a:fld id="{D18B56EA-E28F-4F92-9F16-7A6F2501B303}" type="datetime8">
               <a:rPr lang="en-US" smtClean="0"/>
-              <a:t>9/17/18 3:30 PM</a:t>
+              <a:t>3/4/19 8:29 PM</a:t>
             </a:fld>
             <a:endParaRPr lang="en-US" dirty="0"/>
           </a:p>
@@ -3124,7 +3124,7 @@
           <a:p>
             <a:fld id="{D18B56EA-E28F-4F92-9F16-7A6F2501B303}" type="datetime8">
               <a:rPr lang="en-US" smtClean="0"/>
-              <a:t>9/17/18 3:30 PM</a:t>
+              <a:t>3/4/19 8:29 PM</a:t>
             </a:fld>
             <a:endParaRPr lang="en-US" dirty="0"/>
           </a:p>
@@ -3305,7 +3305,7 @@
           <a:p>
             <a:fld id="{D18B56EA-E28F-4F92-9F16-7A6F2501B303}" type="datetime8">
               <a:rPr lang="en-US" smtClean="0"/>
-              <a:t>9/17/18 3:30 PM</a:t>
+              <a:t>3/4/19 8:29 PM</a:t>
             </a:fld>
             <a:endParaRPr lang="en-US" dirty="0"/>
           </a:p>
@@ -3486,7 +3486,7 @@
           <a:p>
             <a:fld id="{D18B56EA-E28F-4F92-9F16-7A6F2501B303}" type="datetime8">
               <a:rPr lang="en-US" smtClean="0"/>
-              <a:t>9/17/18 3:30 PM</a:t>
+              <a:t>3/4/19 8:29 PM</a:t>
             </a:fld>
             <a:endParaRPr lang="en-US" dirty="0"/>
           </a:p>
@@ -3772,7 +3772,7 @@
                 <a:tabLst/>
                 <a:defRPr/>
               </a:pPr>
-              <a:t>9/17/18 3:30 PM</a:t>
+              <a:t>3/4/19 8:28 PM</a:t>
             </a:fld>
             <a:endParaRPr kumimoji="0" lang="en-US" sz="1200" b="0" i="0" u="none" strike="noStrike" kern="1200" cap="none" spc="0" normalizeH="0" baseline="0" noProof="0" dirty="0">
               <a:ln>
@@ -4289,7 +4289,7 @@
           <a:p>
             <a:fld id="{D18B56EA-E28F-4F92-9F16-7A6F2501B303}" type="datetime8">
               <a:rPr lang="en-US" smtClean="0"/>
-              <a:t>9/17/18 3:30 PM</a:t>
+              <a:t>3/4/19 8:28 PM</a:t>
             </a:fld>
             <a:endParaRPr lang="en-US" dirty="0"/>
           </a:p>
@@ -4657,7 +4657,7 @@
                 <a:tabLst/>
                 <a:defRPr/>
               </a:pPr>
-              <a:t>9/17/18 3:30 PM</a:t>
+              <a:t>3/4/19 8:28 PM</a:t>
             </a:fld>
             <a:endParaRPr kumimoji="0" lang="en-US" sz="1200" b="0" i="0" u="none" strike="noStrike" kern="1200" cap="none" spc="0" normalizeH="0" baseline="0" noProof="0" dirty="0">
               <a:ln>
@@ -4953,7 +4953,7 @@
           <a:p>
             <a:fld id="{D18B56EA-E28F-4F92-9F16-7A6F2501B303}" type="datetime8">
               <a:rPr lang="en-US" smtClean="0"/>
-              <a:t>9/17/18 3:30 PM</a:t>
+              <a:t>3/4/19 8:29 PM</a:t>
             </a:fld>
             <a:endParaRPr lang="en-US" dirty="0"/>
           </a:p>
@@ -5161,7 +5161,7 @@
           <a:p>
             <a:fld id="{D18B56EA-E28F-4F92-9F16-7A6F2501B303}" type="datetime8">
               <a:rPr lang="en-US" smtClean="0"/>
-              <a:t>9/17/18 3:30 PM</a:t>
+              <a:t>3/4/19 8:29 PM</a:t>
             </a:fld>
             <a:endParaRPr lang="en-US" dirty="0"/>
           </a:p>
@@ -5496,7 +5496,7 @@
                 <a:tabLst/>
                 <a:defRPr/>
               </a:pPr>
-              <a:t>9/17/18 3:30 PM</a:t>
+              <a:t>3/4/19 8:29 PM</a:t>
             </a:fld>
             <a:endParaRPr kumimoji="0" lang="en-US" sz="1200" b="0" i="0" u="none" strike="noStrike" kern="1200" cap="none" spc="0" normalizeH="0" baseline="0" noProof="0" dirty="0">
               <a:ln>
@@ -5794,7 +5794,7 @@
           <a:p>
             <a:fld id="{D18B56EA-E28F-4F92-9F16-7A6F2501B303}" type="datetime8">
               <a:rPr lang="en-US" smtClean="0"/>
-              <a:t>9/17/18 3:30 PM</a:t>
+              <a:t>3/4/19 8:29 PM</a:t>
             </a:fld>
             <a:endParaRPr lang="en-US" dirty="0"/>
           </a:p>
@@ -25141,7 +25141,7 @@
         <p159:morph option="byObject"/>
       </p:transition>
     </mc:Choice>
-    <mc:Fallback xmlns:p14="http://schemas.microsoft.com/office/powerpoint/2010/main" xmlns:a14="http://schemas.microsoft.com/office/drawing/2010/main" xmlns="">
+    <mc:Fallback xmlns="" xmlns:a14="http://schemas.microsoft.com/office/drawing/2010/main" xmlns:p14="http://schemas.microsoft.com/office/powerpoint/2010/main">
       <p:transition spd="slow">
         <p:fade/>
       </p:transition>

</xml_diff>

<commit_message>
FY19Q4 content refresh (#589)
</commit_message>
<xml_diff>
--- a/OfficeAddin/01 Building Add-ins for Microsoft Word/01 Text and Formatting in Word Add-ins.pptx
+++ b/OfficeAddin/01 Building Add-ins for Microsoft Word/01 Text and Formatting in Word Add-ins.pptx
@@ -271,7 +271,7 @@
               <a:rPr lang="en-US" smtClean="0">
                 <a:latin typeface="Segoe UI" pitchFamily="34" charset="0"/>
               </a:rPr>
-              <a:t>3/4/19 8:29 PM</a:t>
+              <a:t>6/5/19 4:26 PM</a:t>
             </a:fld>
             <a:endParaRPr lang="en-US" dirty="0">
               <a:latin typeface="Segoe UI" pitchFamily="34" charset="0"/>
@@ -565,7 +565,7 @@
           <a:p>
             <a:fld id="{D18B56EA-E28F-4F92-9F16-7A6F2501B303}" type="datetime8">
               <a:rPr lang="en-US" smtClean="0"/>
-              <a:t>3/4/19 8:28 PM</a:t>
+              <a:t>6/5/19 4:26 PM</a:t>
             </a:fld>
             <a:endParaRPr lang="en-US" dirty="0"/>
           </a:p>
@@ -1053,7 +1053,7 @@
                 <a:tabLst/>
                 <a:defRPr/>
               </a:pPr>
-              <a:t>3/4/19 8:28 PM</a:t>
+              <a:t>6/5/19 4:26 PM</a:t>
             </a:fld>
             <a:endParaRPr kumimoji="0" lang="en-US" sz="1200" b="0" i="0" u="none" strike="noStrike" kern="1200" cap="none" spc="0" normalizeH="0" baseline="0" noProof="0" dirty="0">
               <a:ln>
@@ -1446,7 +1446,7 @@
                 <a:tabLst/>
                 <a:defRPr/>
               </a:pPr>
-              <a:t>3/4/19 8:29 PM</a:t>
+              <a:t>6/5/19 4:26 PM</a:t>
             </a:fld>
             <a:endParaRPr kumimoji="0" lang="en-US" sz="1200" b="0" i="0" u="none" strike="noStrike" kern="1200" cap="none" spc="0" normalizeH="0" baseline="0" noProof="0" dirty="0">
               <a:ln>
@@ -1752,7 +1752,7 @@
           <a:p>
             <a:fld id="{D18B56EA-E28F-4F92-9F16-7A6F2501B303}" type="datetime8">
               <a:rPr lang="en-US" smtClean="0"/>
-              <a:t>3/4/19 8:29 PM</a:t>
+              <a:t>6/5/19 4:26 PM</a:t>
             </a:fld>
             <a:endParaRPr lang="en-US" dirty="0"/>
           </a:p>
@@ -2943,7 +2943,7 @@
           <a:p>
             <a:fld id="{D18B56EA-E28F-4F92-9F16-7A6F2501B303}" type="datetime8">
               <a:rPr lang="en-US" smtClean="0"/>
-              <a:t>3/4/19 8:29 PM</a:t>
+              <a:t>6/5/19 4:26 PM</a:t>
             </a:fld>
             <a:endParaRPr lang="en-US" dirty="0"/>
           </a:p>
@@ -3124,7 +3124,7 @@
           <a:p>
             <a:fld id="{D18B56EA-E28F-4F92-9F16-7A6F2501B303}" type="datetime8">
               <a:rPr lang="en-US" smtClean="0"/>
-              <a:t>3/4/19 8:29 PM</a:t>
+              <a:t>6/5/19 4:26 PM</a:t>
             </a:fld>
             <a:endParaRPr lang="en-US" dirty="0"/>
           </a:p>
@@ -3305,7 +3305,7 @@
           <a:p>
             <a:fld id="{D18B56EA-E28F-4F92-9F16-7A6F2501B303}" type="datetime8">
               <a:rPr lang="en-US" smtClean="0"/>
-              <a:t>3/4/19 8:29 PM</a:t>
+              <a:t>6/5/19 4:26 PM</a:t>
             </a:fld>
             <a:endParaRPr lang="en-US" dirty="0"/>
           </a:p>
@@ -3486,7 +3486,7 @@
           <a:p>
             <a:fld id="{D18B56EA-E28F-4F92-9F16-7A6F2501B303}" type="datetime8">
               <a:rPr lang="en-US" smtClean="0"/>
-              <a:t>3/4/19 8:29 PM</a:t>
+              <a:t>6/5/19 4:26 PM</a:t>
             </a:fld>
             <a:endParaRPr lang="en-US" dirty="0"/>
           </a:p>
@@ -3772,7 +3772,7 @@
                 <a:tabLst/>
                 <a:defRPr/>
               </a:pPr>
-              <a:t>3/4/19 8:28 PM</a:t>
+              <a:t>6/5/19 4:26 PM</a:t>
             </a:fld>
             <a:endParaRPr kumimoji="0" lang="en-US" sz="1200" b="0" i="0" u="none" strike="noStrike" kern="1200" cap="none" spc="0" normalizeH="0" baseline="0" noProof="0" dirty="0">
               <a:ln>
@@ -4289,7 +4289,7 @@
           <a:p>
             <a:fld id="{D18B56EA-E28F-4F92-9F16-7A6F2501B303}" type="datetime8">
               <a:rPr lang="en-US" smtClean="0"/>
-              <a:t>3/4/19 8:28 PM</a:t>
+              <a:t>6/5/19 4:26 PM</a:t>
             </a:fld>
             <a:endParaRPr lang="en-US" dirty="0"/>
           </a:p>
@@ -4657,7 +4657,7 @@
                 <a:tabLst/>
                 <a:defRPr/>
               </a:pPr>
-              <a:t>3/4/19 8:28 PM</a:t>
+              <a:t>6/5/19 4:26 PM</a:t>
             </a:fld>
             <a:endParaRPr kumimoji="0" lang="en-US" sz="1200" b="0" i="0" u="none" strike="noStrike" kern="1200" cap="none" spc="0" normalizeH="0" baseline="0" noProof="0" dirty="0">
               <a:ln>
@@ -4953,7 +4953,7 @@
           <a:p>
             <a:fld id="{D18B56EA-E28F-4F92-9F16-7A6F2501B303}" type="datetime8">
               <a:rPr lang="en-US" smtClean="0"/>
-              <a:t>3/4/19 8:29 PM</a:t>
+              <a:t>6/5/19 4:26 PM</a:t>
             </a:fld>
             <a:endParaRPr lang="en-US" dirty="0"/>
           </a:p>
@@ -5161,7 +5161,7 @@
           <a:p>
             <a:fld id="{D18B56EA-E28F-4F92-9F16-7A6F2501B303}" type="datetime8">
               <a:rPr lang="en-US" smtClean="0"/>
-              <a:t>3/4/19 8:29 PM</a:t>
+              <a:t>6/5/19 4:26 PM</a:t>
             </a:fld>
             <a:endParaRPr lang="en-US" dirty="0"/>
           </a:p>
@@ -5496,7 +5496,7 @@
                 <a:tabLst/>
                 <a:defRPr/>
               </a:pPr>
-              <a:t>3/4/19 8:29 PM</a:t>
+              <a:t>6/5/19 4:26 PM</a:t>
             </a:fld>
             <a:endParaRPr kumimoji="0" lang="en-US" sz="1200" b="0" i="0" u="none" strike="noStrike" kern="1200" cap="none" spc="0" normalizeH="0" baseline="0" noProof="0" dirty="0">
               <a:ln>
@@ -5794,7 +5794,7 @@
           <a:p>
             <a:fld id="{D18B56EA-E28F-4F92-9F16-7A6F2501B303}" type="datetime8">
               <a:rPr lang="en-US" smtClean="0"/>
-              <a:t>3/4/19 8:29 PM</a:t>
+              <a:t>6/5/19 4:26 PM</a:t>
             </a:fld>
             <a:endParaRPr lang="en-US" dirty="0"/>
           </a:p>
@@ -16090,7 +16090,7 @@
       </a:lvl9pPr>
     </p:otherStyle>
   </p:txStyles>
-  <p:extLst mod="1">
+  <p:extLst>
     <p:ext uri="{27BBF7A9-308A-43DC-89C8-2F10F3537804}">
       <p15:sldGuideLst xmlns:p15="http://schemas.microsoft.com/office/powerpoint/2012/main">
         <p15:guide id="3" pos="1381" userDrawn="1">
@@ -19742,9 +19742,7 @@
       </p:sp>
       <p:sp>
         <p:nvSpPr>
-          <p:cNvPr id="159" name="Content Placeholder 6">
-            <a:extLst/>
-          </p:cNvPr>
+          <p:cNvPr id="159" name="Content Placeholder 6"/>
           <p:cNvSpPr txBox="1">
             <a:spLocks/>
           </p:cNvSpPr>
@@ -21449,7 +21447,6 @@
                 <a:headEnd/>
                 <a:tailEnd/>
               </a:ln>
-              <a:extLst/>
             </p:spPr>
             <p:txBody>
               <a:bodyPr vert="horz" wrap="square" lIns="91414" tIns="45706" rIns="91414" bIns="45706" numCol="1" anchor="t" anchorCtr="0" compatLnSpc="1">
@@ -24188,7 +24185,6 @@
               <a:headEnd/>
               <a:tailEnd/>
             </a:ln>
-            <a:extLst/>
           </p:spPr>
           <p:txBody>
             <a:bodyPr vert="horz" wrap="square" lIns="91414" tIns="45706" rIns="91414" bIns="45706" numCol="1" anchor="t" anchorCtr="0" compatLnSpc="1">
@@ -24510,9 +24506,7 @@
         </p:sp>
         <p:sp>
           <p:nvSpPr>
-            <p:cNvPr id="297" name="Rectangle 296">
-              <a:extLst/>
-            </p:cNvPr>
+            <p:cNvPr id="297" name="Rectangle 296"/>
             <p:cNvSpPr/>
             <p:nvPr/>
           </p:nvSpPr>
@@ -24591,9 +24585,7 @@
         </p:sp>
         <p:sp>
           <p:nvSpPr>
-            <p:cNvPr id="298" name="Rectangle 297">
-              <a:extLst/>
-            </p:cNvPr>
+            <p:cNvPr id="298" name="Rectangle 297"/>
             <p:cNvSpPr/>
             <p:nvPr/>
           </p:nvSpPr>
@@ -25141,7 +25133,7 @@
         <p159:morph option="byObject"/>
       </p:transition>
     </mc:Choice>
-    <mc:Fallback xmlns="" xmlns:a14="http://schemas.microsoft.com/office/drawing/2010/main" xmlns:p14="http://schemas.microsoft.com/office/powerpoint/2010/main">
+    <mc:Fallback xmlns:p14="http://schemas.microsoft.com/office/powerpoint/2010/main" xmlns:a14="http://schemas.microsoft.com/office/drawing/2010/main" xmlns="">
       <p:transition spd="slow">
         <p:fade/>
       </p:transition>

</xml_diff>

<commit_message>
FY2020Q1 OfficeAddins M1 content refresh
</commit_message>
<xml_diff>
--- a/OfficeAddin/01 Building Add-ins for Microsoft Word/01 Text and Formatting in Word Add-ins.pptx
+++ b/OfficeAddin/01 Building Add-ins for Microsoft Word/01 Text and Formatting in Word Add-ins.pptx
@@ -271,7 +271,7 @@
               <a:rPr lang="en-US" smtClean="0">
                 <a:latin typeface="Segoe UI" pitchFamily="34" charset="0"/>
               </a:rPr>
-              <a:t>6/5/19 4:26 PM</a:t>
+              <a:t>9/8/19 8:14 PM</a:t>
             </a:fld>
             <a:endParaRPr lang="en-US" dirty="0">
               <a:latin typeface="Segoe UI" pitchFamily="34" charset="0"/>
@@ -565,7 +565,7 @@
           <a:p>
             <a:fld id="{D18B56EA-E28F-4F92-9F16-7A6F2501B303}" type="datetime8">
               <a:rPr lang="en-US" smtClean="0"/>
-              <a:t>6/5/19 4:26 PM</a:t>
+              <a:t>9/8/19 8:14 PM</a:t>
             </a:fld>
             <a:endParaRPr lang="en-US" dirty="0"/>
           </a:p>
@@ -1053,7 +1053,7 @@
                 <a:tabLst/>
                 <a:defRPr/>
               </a:pPr>
-              <a:t>6/5/19 4:26 PM</a:t>
+              <a:t>9/8/19 8:14 PM</a:t>
             </a:fld>
             <a:endParaRPr kumimoji="0" lang="en-US" sz="1200" b="0" i="0" u="none" strike="noStrike" kern="1200" cap="none" spc="0" normalizeH="0" baseline="0" noProof="0" dirty="0">
               <a:ln>
@@ -1446,7 +1446,7 @@
                 <a:tabLst/>
                 <a:defRPr/>
               </a:pPr>
-              <a:t>6/5/19 4:26 PM</a:t>
+              <a:t>9/8/19 8:14 PM</a:t>
             </a:fld>
             <a:endParaRPr kumimoji="0" lang="en-US" sz="1200" b="0" i="0" u="none" strike="noStrike" kern="1200" cap="none" spc="0" normalizeH="0" baseline="0" noProof="0" dirty="0">
               <a:ln>
@@ -1752,7 +1752,7 @@
           <a:p>
             <a:fld id="{D18B56EA-E28F-4F92-9F16-7A6F2501B303}" type="datetime8">
               <a:rPr lang="en-US" smtClean="0"/>
-              <a:t>6/5/19 4:26 PM</a:t>
+              <a:t>9/8/19 8:14 PM</a:t>
             </a:fld>
             <a:endParaRPr lang="en-US" dirty="0"/>
           </a:p>
@@ -2943,7 +2943,7 @@
           <a:p>
             <a:fld id="{D18B56EA-E28F-4F92-9F16-7A6F2501B303}" type="datetime8">
               <a:rPr lang="en-US" smtClean="0"/>
-              <a:t>6/5/19 4:26 PM</a:t>
+              <a:t>9/8/19 8:14 PM</a:t>
             </a:fld>
             <a:endParaRPr lang="en-US" dirty="0"/>
           </a:p>
@@ -3124,7 +3124,7 @@
           <a:p>
             <a:fld id="{D18B56EA-E28F-4F92-9F16-7A6F2501B303}" type="datetime8">
               <a:rPr lang="en-US" smtClean="0"/>
-              <a:t>6/5/19 4:26 PM</a:t>
+              <a:t>9/8/19 8:14 PM</a:t>
             </a:fld>
             <a:endParaRPr lang="en-US" dirty="0"/>
           </a:p>
@@ -3305,7 +3305,7 @@
           <a:p>
             <a:fld id="{D18B56EA-E28F-4F92-9F16-7A6F2501B303}" type="datetime8">
               <a:rPr lang="en-US" smtClean="0"/>
-              <a:t>6/5/19 4:26 PM</a:t>
+              <a:t>9/8/19 8:14 PM</a:t>
             </a:fld>
             <a:endParaRPr lang="en-US" dirty="0"/>
           </a:p>
@@ -3486,7 +3486,7 @@
           <a:p>
             <a:fld id="{D18B56EA-E28F-4F92-9F16-7A6F2501B303}" type="datetime8">
               <a:rPr lang="en-US" smtClean="0"/>
-              <a:t>6/5/19 4:26 PM</a:t>
+              <a:t>9/8/19 8:14 PM</a:t>
             </a:fld>
             <a:endParaRPr lang="en-US" dirty="0"/>
           </a:p>
@@ -3772,7 +3772,7 @@
                 <a:tabLst/>
                 <a:defRPr/>
               </a:pPr>
-              <a:t>6/5/19 4:26 PM</a:t>
+              <a:t>9/8/19 8:14 PM</a:t>
             </a:fld>
             <a:endParaRPr kumimoji="0" lang="en-US" sz="1200" b="0" i="0" u="none" strike="noStrike" kern="1200" cap="none" spc="0" normalizeH="0" baseline="0" noProof="0" dirty="0">
               <a:ln>
@@ -4289,7 +4289,7 @@
           <a:p>
             <a:fld id="{D18B56EA-E28F-4F92-9F16-7A6F2501B303}" type="datetime8">
               <a:rPr lang="en-US" smtClean="0"/>
-              <a:t>6/5/19 4:26 PM</a:t>
+              <a:t>9/8/19 8:14 PM</a:t>
             </a:fld>
             <a:endParaRPr lang="en-US" dirty="0"/>
           </a:p>
@@ -4657,7 +4657,7 @@
                 <a:tabLst/>
                 <a:defRPr/>
               </a:pPr>
-              <a:t>6/5/19 4:26 PM</a:t>
+              <a:t>9/8/19 8:14 PM</a:t>
             </a:fld>
             <a:endParaRPr kumimoji="0" lang="en-US" sz="1200" b="0" i="0" u="none" strike="noStrike" kern="1200" cap="none" spc="0" normalizeH="0" baseline="0" noProof="0" dirty="0">
               <a:ln>
@@ -4953,7 +4953,7 @@
           <a:p>
             <a:fld id="{D18B56EA-E28F-4F92-9F16-7A6F2501B303}" type="datetime8">
               <a:rPr lang="en-US" smtClean="0"/>
-              <a:t>6/5/19 4:26 PM</a:t>
+              <a:t>9/8/19 8:14 PM</a:t>
             </a:fld>
             <a:endParaRPr lang="en-US" dirty="0"/>
           </a:p>
@@ -5161,7 +5161,7 @@
           <a:p>
             <a:fld id="{D18B56EA-E28F-4F92-9F16-7A6F2501B303}" type="datetime8">
               <a:rPr lang="en-US" smtClean="0"/>
-              <a:t>6/5/19 4:26 PM</a:t>
+              <a:t>9/8/19 8:14 PM</a:t>
             </a:fld>
             <a:endParaRPr lang="en-US" dirty="0"/>
           </a:p>
@@ -5496,7 +5496,7 @@
                 <a:tabLst/>
                 <a:defRPr/>
               </a:pPr>
-              <a:t>6/5/19 4:26 PM</a:t>
+              <a:t>9/8/19 8:14 PM</a:t>
             </a:fld>
             <a:endParaRPr kumimoji="0" lang="en-US" sz="1200" b="0" i="0" u="none" strike="noStrike" kern="1200" cap="none" spc="0" normalizeH="0" baseline="0" noProof="0" dirty="0">
               <a:ln>
@@ -5794,7 +5794,7 @@
           <a:p>
             <a:fld id="{D18B56EA-E28F-4F92-9F16-7A6F2501B303}" type="datetime8">
               <a:rPr lang="en-US" smtClean="0"/>
-              <a:t>6/5/19 4:26 PM</a:t>
+              <a:t>9/8/19 8:14 PM</a:t>
             </a:fld>
             <a:endParaRPr lang="en-US" dirty="0"/>
           </a:p>
@@ -18775,7 +18775,7 @@
         <p:spPr>
           <a:xfrm>
             <a:off x="465138" y="1930734"/>
-            <a:ext cx="11533187" cy="4431983"/>
+            <a:ext cx="11533187" cy="4816703"/>
           </a:xfrm>
         </p:spPr>
         <p:txBody>
@@ -18891,7 +18891,7 @@
                 <a:latin typeface="+mj-lt"/>
                 <a:hlinkClick r:id="rId4"/>
               </a:rPr>
-              <a:t>https://dev.office.com/reference/add-ins/word/word-add-ins-reference-overview</a:t>
+              <a:t>https://docs.microsoft.com/en-us/office/dev/add-ins/word/</a:t>
             </a:r>
             <a:endParaRPr lang="en-US" sz="1800" dirty="0">
               <a:latin typeface="+mj-lt"/>
@@ -19011,11 +19011,28 @@
             </a:pPr>
             <a:r>
               <a:rPr lang="en-US" sz="1800" dirty="0">
+                <a:latin typeface="+mj-lt"/>
                 <a:hlinkClick r:id="rId6"/>
               </a:rPr>
-              <a:t>https://dev.office.com/reference/add-ins/word/paragraph</a:t>
-            </a:r>
-            <a:endParaRPr lang="en-US" sz="1800" dirty="0"/>
+              <a:t>https://docs.microsoft.com/en-us/javascript/api/word/word.paragraph</a:t>
+            </a:r>
+            <a:endParaRPr lang="en-US" sz="1800">
+              <a:latin typeface="+mj-lt"/>
+            </a:endParaRPr>
+          </a:p>
+          <a:p>
+            <a:pPr marL="342900" indent="-342900" defTabSz="914400">
+              <a:lnSpc>
+                <a:spcPct val="100000"/>
+              </a:lnSpc>
+              <a:spcBef>
+                <a:spcPts val="600"/>
+              </a:spcBef>
+              <a:buSzTx/>
+            </a:pPr>
+            <a:endParaRPr lang="en-US" sz="1800" dirty="0">
+              <a:latin typeface="+mj-lt"/>
+            </a:endParaRPr>
           </a:p>
           <a:p>
             <a:pPr marL="342900" indent="-342900" defTabSz="914400">

</xml_diff>

<commit_message>
FY2020Q1 OfficeAddins M1 content refresh (#618)
</commit_message>
<xml_diff>
--- a/OfficeAddin/01 Building Add-ins for Microsoft Word/01 Text and Formatting in Word Add-ins.pptx
+++ b/OfficeAddin/01 Building Add-ins for Microsoft Word/01 Text and Formatting in Word Add-ins.pptx
@@ -271,7 +271,7 @@
               <a:rPr lang="en-US" smtClean="0">
                 <a:latin typeface="Segoe UI" pitchFamily="34" charset="0"/>
               </a:rPr>
-              <a:t>6/5/19 4:26 PM</a:t>
+              <a:t>9/8/19 8:14 PM</a:t>
             </a:fld>
             <a:endParaRPr lang="en-US" dirty="0">
               <a:latin typeface="Segoe UI" pitchFamily="34" charset="0"/>
@@ -565,7 +565,7 @@
           <a:p>
             <a:fld id="{D18B56EA-E28F-4F92-9F16-7A6F2501B303}" type="datetime8">
               <a:rPr lang="en-US" smtClean="0"/>
-              <a:t>6/5/19 4:26 PM</a:t>
+              <a:t>9/8/19 8:14 PM</a:t>
             </a:fld>
             <a:endParaRPr lang="en-US" dirty="0"/>
           </a:p>
@@ -1053,7 +1053,7 @@
                 <a:tabLst/>
                 <a:defRPr/>
               </a:pPr>
-              <a:t>6/5/19 4:26 PM</a:t>
+              <a:t>9/8/19 8:14 PM</a:t>
             </a:fld>
             <a:endParaRPr kumimoji="0" lang="en-US" sz="1200" b="0" i="0" u="none" strike="noStrike" kern="1200" cap="none" spc="0" normalizeH="0" baseline="0" noProof="0" dirty="0">
               <a:ln>
@@ -1446,7 +1446,7 @@
                 <a:tabLst/>
                 <a:defRPr/>
               </a:pPr>
-              <a:t>6/5/19 4:26 PM</a:t>
+              <a:t>9/8/19 8:14 PM</a:t>
             </a:fld>
             <a:endParaRPr kumimoji="0" lang="en-US" sz="1200" b="0" i="0" u="none" strike="noStrike" kern="1200" cap="none" spc="0" normalizeH="0" baseline="0" noProof="0" dirty="0">
               <a:ln>
@@ -1752,7 +1752,7 @@
           <a:p>
             <a:fld id="{D18B56EA-E28F-4F92-9F16-7A6F2501B303}" type="datetime8">
               <a:rPr lang="en-US" smtClean="0"/>
-              <a:t>6/5/19 4:26 PM</a:t>
+              <a:t>9/8/19 8:14 PM</a:t>
             </a:fld>
             <a:endParaRPr lang="en-US" dirty="0"/>
           </a:p>
@@ -2943,7 +2943,7 @@
           <a:p>
             <a:fld id="{D18B56EA-E28F-4F92-9F16-7A6F2501B303}" type="datetime8">
               <a:rPr lang="en-US" smtClean="0"/>
-              <a:t>6/5/19 4:26 PM</a:t>
+              <a:t>9/8/19 8:14 PM</a:t>
             </a:fld>
             <a:endParaRPr lang="en-US" dirty="0"/>
           </a:p>
@@ -3124,7 +3124,7 @@
           <a:p>
             <a:fld id="{D18B56EA-E28F-4F92-9F16-7A6F2501B303}" type="datetime8">
               <a:rPr lang="en-US" smtClean="0"/>
-              <a:t>6/5/19 4:26 PM</a:t>
+              <a:t>9/8/19 8:14 PM</a:t>
             </a:fld>
             <a:endParaRPr lang="en-US" dirty="0"/>
           </a:p>
@@ -3305,7 +3305,7 @@
           <a:p>
             <a:fld id="{D18B56EA-E28F-4F92-9F16-7A6F2501B303}" type="datetime8">
               <a:rPr lang="en-US" smtClean="0"/>
-              <a:t>6/5/19 4:26 PM</a:t>
+              <a:t>9/8/19 8:14 PM</a:t>
             </a:fld>
             <a:endParaRPr lang="en-US" dirty="0"/>
           </a:p>
@@ -3486,7 +3486,7 @@
           <a:p>
             <a:fld id="{D18B56EA-E28F-4F92-9F16-7A6F2501B303}" type="datetime8">
               <a:rPr lang="en-US" smtClean="0"/>
-              <a:t>6/5/19 4:26 PM</a:t>
+              <a:t>9/8/19 8:14 PM</a:t>
             </a:fld>
             <a:endParaRPr lang="en-US" dirty="0"/>
           </a:p>
@@ -3772,7 +3772,7 @@
                 <a:tabLst/>
                 <a:defRPr/>
               </a:pPr>
-              <a:t>6/5/19 4:26 PM</a:t>
+              <a:t>9/8/19 8:14 PM</a:t>
             </a:fld>
             <a:endParaRPr kumimoji="0" lang="en-US" sz="1200" b="0" i="0" u="none" strike="noStrike" kern="1200" cap="none" spc="0" normalizeH="0" baseline="0" noProof="0" dirty="0">
               <a:ln>
@@ -4289,7 +4289,7 @@
           <a:p>
             <a:fld id="{D18B56EA-E28F-4F92-9F16-7A6F2501B303}" type="datetime8">
               <a:rPr lang="en-US" smtClean="0"/>
-              <a:t>6/5/19 4:26 PM</a:t>
+              <a:t>9/8/19 8:14 PM</a:t>
             </a:fld>
             <a:endParaRPr lang="en-US" dirty="0"/>
           </a:p>
@@ -4657,7 +4657,7 @@
                 <a:tabLst/>
                 <a:defRPr/>
               </a:pPr>
-              <a:t>6/5/19 4:26 PM</a:t>
+              <a:t>9/8/19 8:14 PM</a:t>
             </a:fld>
             <a:endParaRPr kumimoji="0" lang="en-US" sz="1200" b="0" i="0" u="none" strike="noStrike" kern="1200" cap="none" spc="0" normalizeH="0" baseline="0" noProof="0" dirty="0">
               <a:ln>
@@ -4953,7 +4953,7 @@
           <a:p>
             <a:fld id="{D18B56EA-E28F-4F92-9F16-7A6F2501B303}" type="datetime8">
               <a:rPr lang="en-US" smtClean="0"/>
-              <a:t>6/5/19 4:26 PM</a:t>
+              <a:t>9/8/19 8:14 PM</a:t>
             </a:fld>
             <a:endParaRPr lang="en-US" dirty="0"/>
           </a:p>
@@ -5161,7 +5161,7 @@
           <a:p>
             <a:fld id="{D18B56EA-E28F-4F92-9F16-7A6F2501B303}" type="datetime8">
               <a:rPr lang="en-US" smtClean="0"/>
-              <a:t>6/5/19 4:26 PM</a:t>
+              <a:t>9/8/19 8:14 PM</a:t>
             </a:fld>
             <a:endParaRPr lang="en-US" dirty="0"/>
           </a:p>
@@ -5496,7 +5496,7 @@
                 <a:tabLst/>
                 <a:defRPr/>
               </a:pPr>
-              <a:t>6/5/19 4:26 PM</a:t>
+              <a:t>9/8/19 8:14 PM</a:t>
             </a:fld>
             <a:endParaRPr kumimoji="0" lang="en-US" sz="1200" b="0" i="0" u="none" strike="noStrike" kern="1200" cap="none" spc="0" normalizeH="0" baseline="0" noProof="0" dirty="0">
               <a:ln>
@@ -5794,7 +5794,7 @@
           <a:p>
             <a:fld id="{D18B56EA-E28F-4F92-9F16-7A6F2501B303}" type="datetime8">
               <a:rPr lang="en-US" smtClean="0"/>
-              <a:t>6/5/19 4:26 PM</a:t>
+              <a:t>9/8/19 8:14 PM</a:t>
             </a:fld>
             <a:endParaRPr lang="en-US" dirty="0"/>
           </a:p>
@@ -18775,7 +18775,7 @@
         <p:spPr>
           <a:xfrm>
             <a:off x="465138" y="1930734"/>
-            <a:ext cx="11533187" cy="4431983"/>
+            <a:ext cx="11533187" cy="4816703"/>
           </a:xfrm>
         </p:spPr>
         <p:txBody>
@@ -18891,7 +18891,7 @@
                 <a:latin typeface="+mj-lt"/>
                 <a:hlinkClick r:id="rId4"/>
               </a:rPr>
-              <a:t>https://dev.office.com/reference/add-ins/word/word-add-ins-reference-overview</a:t>
+              <a:t>https://docs.microsoft.com/en-us/office/dev/add-ins/word/</a:t>
             </a:r>
             <a:endParaRPr lang="en-US" sz="1800" dirty="0">
               <a:latin typeface="+mj-lt"/>
@@ -19011,11 +19011,28 @@
             </a:pPr>
             <a:r>
               <a:rPr lang="en-US" sz="1800" dirty="0">
+                <a:latin typeface="+mj-lt"/>
                 <a:hlinkClick r:id="rId6"/>
               </a:rPr>
-              <a:t>https://dev.office.com/reference/add-ins/word/paragraph</a:t>
-            </a:r>
-            <a:endParaRPr lang="en-US" sz="1800" dirty="0"/>
+              <a:t>https://docs.microsoft.com/en-us/javascript/api/word/word.paragraph</a:t>
+            </a:r>
+            <a:endParaRPr lang="en-US" sz="1800">
+              <a:latin typeface="+mj-lt"/>
+            </a:endParaRPr>
+          </a:p>
+          <a:p>
+            <a:pPr marL="342900" indent="-342900" defTabSz="914400">
+              <a:lnSpc>
+                <a:spcPct val="100000"/>
+              </a:lnSpc>
+              <a:spcBef>
+                <a:spcPts val="600"/>
+              </a:spcBef>
+              <a:buSzTx/>
+            </a:pPr>
+            <a:endParaRPr lang="en-US" sz="1800" dirty="0">
+              <a:latin typeface="+mj-lt"/>
+            </a:endParaRPr>
           </a:p>
           <a:p>
             <a:pPr marL="342900" indent="-342900" defTabSz="914400">

</xml_diff>

<commit_message>
FY2020Q2 content refresh - officeaddins - m01
- update module to use latest yeoman generator
</commit_message>
<xml_diff>
--- a/OfficeAddin/01 Building Add-ins for Microsoft Word/01 Text and Formatting in Word Add-ins.pptx
+++ b/OfficeAddin/01 Building Add-ins for Microsoft Word/01 Text and Formatting in Word Add-ins.pptx
@@ -271,7 +271,7 @@
               <a:rPr lang="en-US" smtClean="0">
                 <a:latin typeface="Segoe UI" pitchFamily="34" charset="0"/>
               </a:rPr>
-              <a:t>9/8/19 8:14 PM</a:t>
+              <a:t>12/8/19 8:32 PM</a:t>
             </a:fld>
             <a:endParaRPr lang="en-US" dirty="0">
               <a:latin typeface="Segoe UI" pitchFamily="34" charset="0"/>
@@ -565,7 +565,7 @@
           <a:p>
             <a:fld id="{D18B56EA-E28F-4F92-9F16-7A6F2501B303}" type="datetime8">
               <a:rPr lang="en-US" smtClean="0"/>
-              <a:t>9/8/19 8:14 PM</a:t>
+              <a:t>12/8/19 8:32 PM</a:t>
             </a:fld>
             <a:endParaRPr lang="en-US" dirty="0"/>
           </a:p>
@@ -1053,7 +1053,7 @@
                 <a:tabLst/>
                 <a:defRPr/>
               </a:pPr>
-              <a:t>9/8/19 8:14 PM</a:t>
+              <a:t>12/8/19 8:32 PM</a:t>
             </a:fld>
             <a:endParaRPr kumimoji="0" lang="en-US" sz="1200" b="0" i="0" u="none" strike="noStrike" kern="1200" cap="none" spc="0" normalizeH="0" baseline="0" noProof="0" dirty="0">
               <a:ln>
@@ -1446,7 +1446,7 @@
                 <a:tabLst/>
                 <a:defRPr/>
               </a:pPr>
-              <a:t>9/8/19 8:14 PM</a:t>
+              <a:t>12/8/19 8:32 PM</a:t>
             </a:fld>
             <a:endParaRPr kumimoji="0" lang="en-US" sz="1200" b="0" i="0" u="none" strike="noStrike" kern="1200" cap="none" spc="0" normalizeH="0" baseline="0" noProof="0" dirty="0">
               <a:ln>
@@ -1752,7 +1752,7 @@
           <a:p>
             <a:fld id="{D18B56EA-E28F-4F92-9F16-7A6F2501B303}" type="datetime8">
               <a:rPr lang="en-US" smtClean="0"/>
-              <a:t>9/8/19 8:14 PM</a:t>
+              <a:t>12/8/19 8:32 PM</a:t>
             </a:fld>
             <a:endParaRPr lang="en-US" dirty="0"/>
           </a:p>
@@ -2943,7 +2943,7 @@
           <a:p>
             <a:fld id="{D18B56EA-E28F-4F92-9F16-7A6F2501B303}" type="datetime8">
               <a:rPr lang="en-US" smtClean="0"/>
-              <a:t>9/8/19 8:14 PM</a:t>
+              <a:t>12/8/19 8:32 PM</a:t>
             </a:fld>
             <a:endParaRPr lang="en-US" dirty="0"/>
           </a:p>
@@ -3124,7 +3124,7 @@
           <a:p>
             <a:fld id="{D18B56EA-E28F-4F92-9F16-7A6F2501B303}" type="datetime8">
               <a:rPr lang="en-US" smtClean="0"/>
-              <a:t>9/8/19 8:14 PM</a:t>
+              <a:t>12/8/19 8:32 PM</a:t>
             </a:fld>
             <a:endParaRPr lang="en-US" dirty="0"/>
           </a:p>
@@ -3305,7 +3305,7 @@
           <a:p>
             <a:fld id="{D18B56EA-E28F-4F92-9F16-7A6F2501B303}" type="datetime8">
               <a:rPr lang="en-US" smtClean="0"/>
-              <a:t>9/8/19 8:14 PM</a:t>
+              <a:t>12/8/19 8:32 PM</a:t>
             </a:fld>
             <a:endParaRPr lang="en-US" dirty="0"/>
           </a:p>
@@ -3486,7 +3486,7 @@
           <a:p>
             <a:fld id="{D18B56EA-E28F-4F92-9F16-7A6F2501B303}" type="datetime8">
               <a:rPr lang="en-US" smtClean="0"/>
-              <a:t>9/8/19 8:14 PM</a:t>
+              <a:t>12/8/19 8:32 PM</a:t>
             </a:fld>
             <a:endParaRPr lang="en-US" dirty="0"/>
           </a:p>
@@ -3772,7 +3772,7 @@
                 <a:tabLst/>
                 <a:defRPr/>
               </a:pPr>
-              <a:t>9/8/19 8:14 PM</a:t>
+              <a:t>12/8/19 8:32 PM</a:t>
             </a:fld>
             <a:endParaRPr kumimoji="0" lang="en-US" sz="1200" b="0" i="0" u="none" strike="noStrike" kern="1200" cap="none" spc="0" normalizeH="0" baseline="0" noProof="0" dirty="0">
               <a:ln>
@@ -4289,7 +4289,7 @@
           <a:p>
             <a:fld id="{D18B56EA-E28F-4F92-9F16-7A6F2501B303}" type="datetime8">
               <a:rPr lang="en-US" smtClean="0"/>
-              <a:t>9/8/19 8:14 PM</a:t>
+              <a:t>12/8/19 8:32 PM</a:t>
             </a:fld>
             <a:endParaRPr lang="en-US" dirty="0"/>
           </a:p>
@@ -4657,7 +4657,7 @@
                 <a:tabLst/>
                 <a:defRPr/>
               </a:pPr>
-              <a:t>9/8/19 8:14 PM</a:t>
+              <a:t>12/8/19 8:32 PM</a:t>
             </a:fld>
             <a:endParaRPr kumimoji="0" lang="en-US" sz="1200" b="0" i="0" u="none" strike="noStrike" kern="1200" cap="none" spc="0" normalizeH="0" baseline="0" noProof="0" dirty="0">
               <a:ln>
@@ -4953,7 +4953,7 @@
           <a:p>
             <a:fld id="{D18B56EA-E28F-4F92-9F16-7A6F2501B303}" type="datetime8">
               <a:rPr lang="en-US" smtClean="0"/>
-              <a:t>9/8/19 8:14 PM</a:t>
+              <a:t>12/8/19 8:32 PM</a:t>
             </a:fld>
             <a:endParaRPr lang="en-US" dirty="0"/>
           </a:p>
@@ -5161,7 +5161,7 @@
           <a:p>
             <a:fld id="{D18B56EA-E28F-4F92-9F16-7A6F2501B303}" type="datetime8">
               <a:rPr lang="en-US" smtClean="0"/>
-              <a:t>9/8/19 8:14 PM</a:t>
+              <a:t>12/8/19 8:32 PM</a:t>
             </a:fld>
             <a:endParaRPr lang="en-US" dirty="0"/>
           </a:p>
@@ -5496,7 +5496,7 @@
                 <a:tabLst/>
                 <a:defRPr/>
               </a:pPr>
-              <a:t>9/8/19 8:14 PM</a:t>
+              <a:t>12/8/19 8:32 PM</a:t>
             </a:fld>
             <a:endParaRPr kumimoji="0" lang="en-US" sz="1200" b="0" i="0" u="none" strike="noStrike" kern="1200" cap="none" spc="0" normalizeH="0" baseline="0" noProof="0" dirty="0">
               <a:ln>
@@ -5794,7 +5794,7 @@
           <a:p>
             <a:fld id="{D18B56EA-E28F-4F92-9F16-7A6F2501B303}" type="datetime8">
               <a:rPr lang="en-US" smtClean="0"/>
-              <a:t>9/8/19 8:14 PM</a:t>
+              <a:t>12/8/19 8:32 PM</a:t>
             </a:fld>
             <a:endParaRPr lang="en-US" dirty="0"/>
           </a:p>
@@ -16277,7 +16277,11 @@
           <a:p>
             <a:r>
               <a:rPr lang="en-US" dirty="0"/>
-              <a:t>Working with Text and Formatting</a:t>
+              <a:t>Working with Text </a:t>
+            </a:r>
+            <a:r>
+              <a:rPr lang="en-US"/>
+              <a:t>and Formatting </a:t>
             </a:r>
             <a:endParaRPr lang="en-US" dirty="0">
               <a:noFill/>
@@ -25150,7 +25154,7 @@
         <p159:morph option="byObject"/>
       </p:transition>
     </mc:Choice>
-    <mc:Fallback xmlns:p14="http://schemas.microsoft.com/office/powerpoint/2010/main" xmlns:a14="http://schemas.microsoft.com/office/drawing/2010/main" xmlns="">
+    <mc:Fallback xmlns="" xmlns:a14="http://schemas.microsoft.com/office/drawing/2010/main" xmlns:p14="http://schemas.microsoft.com/office/powerpoint/2010/main">
       <p:transition spd="slow">
         <p:fade/>
       </p:transition>

</xml_diff>

<commit_message>
FY2020Q2 content refresh - officeaddins - m01 (#654)
- update module to use latest yeoman generator
</commit_message>
<xml_diff>
--- a/OfficeAddin/01 Building Add-ins for Microsoft Word/01 Text and Formatting in Word Add-ins.pptx
+++ b/OfficeAddin/01 Building Add-ins for Microsoft Word/01 Text and Formatting in Word Add-ins.pptx
@@ -271,7 +271,7 @@
               <a:rPr lang="en-US" smtClean="0">
                 <a:latin typeface="Segoe UI" pitchFamily="34" charset="0"/>
               </a:rPr>
-              <a:t>9/8/19 8:14 PM</a:t>
+              <a:t>12/8/19 8:32 PM</a:t>
             </a:fld>
             <a:endParaRPr lang="en-US" dirty="0">
               <a:latin typeface="Segoe UI" pitchFamily="34" charset="0"/>
@@ -565,7 +565,7 @@
           <a:p>
             <a:fld id="{D18B56EA-E28F-4F92-9F16-7A6F2501B303}" type="datetime8">
               <a:rPr lang="en-US" smtClean="0"/>
-              <a:t>9/8/19 8:14 PM</a:t>
+              <a:t>12/8/19 8:32 PM</a:t>
             </a:fld>
             <a:endParaRPr lang="en-US" dirty="0"/>
           </a:p>
@@ -1053,7 +1053,7 @@
                 <a:tabLst/>
                 <a:defRPr/>
               </a:pPr>
-              <a:t>9/8/19 8:14 PM</a:t>
+              <a:t>12/8/19 8:32 PM</a:t>
             </a:fld>
             <a:endParaRPr kumimoji="0" lang="en-US" sz="1200" b="0" i="0" u="none" strike="noStrike" kern="1200" cap="none" spc="0" normalizeH="0" baseline="0" noProof="0" dirty="0">
               <a:ln>
@@ -1446,7 +1446,7 @@
                 <a:tabLst/>
                 <a:defRPr/>
               </a:pPr>
-              <a:t>9/8/19 8:14 PM</a:t>
+              <a:t>12/8/19 8:32 PM</a:t>
             </a:fld>
             <a:endParaRPr kumimoji="0" lang="en-US" sz="1200" b="0" i="0" u="none" strike="noStrike" kern="1200" cap="none" spc="0" normalizeH="0" baseline="0" noProof="0" dirty="0">
               <a:ln>
@@ -1752,7 +1752,7 @@
           <a:p>
             <a:fld id="{D18B56EA-E28F-4F92-9F16-7A6F2501B303}" type="datetime8">
               <a:rPr lang="en-US" smtClean="0"/>
-              <a:t>9/8/19 8:14 PM</a:t>
+              <a:t>12/8/19 8:32 PM</a:t>
             </a:fld>
             <a:endParaRPr lang="en-US" dirty="0"/>
           </a:p>
@@ -2943,7 +2943,7 @@
           <a:p>
             <a:fld id="{D18B56EA-E28F-4F92-9F16-7A6F2501B303}" type="datetime8">
               <a:rPr lang="en-US" smtClean="0"/>
-              <a:t>9/8/19 8:14 PM</a:t>
+              <a:t>12/8/19 8:32 PM</a:t>
             </a:fld>
             <a:endParaRPr lang="en-US" dirty="0"/>
           </a:p>
@@ -3124,7 +3124,7 @@
           <a:p>
             <a:fld id="{D18B56EA-E28F-4F92-9F16-7A6F2501B303}" type="datetime8">
               <a:rPr lang="en-US" smtClean="0"/>
-              <a:t>9/8/19 8:14 PM</a:t>
+              <a:t>12/8/19 8:32 PM</a:t>
             </a:fld>
             <a:endParaRPr lang="en-US" dirty="0"/>
           </a:p>
@@ -3305,7 +3305,7 @@
           <a:p>
             <a:fld id="{D18B56EA-E28F-4F92-9F16-7A6F2501B303}" type="datetime8">
               <a:rPr lang="en-US" smtClean="0"/>
-              <a:t>9/8/19 8:14 PM</a:t>
+              <a:t>12/8/19 8:32 PM</a:t>
             </a:fld>
             <a:endParaRPr lang="en-US" dirty="0"/>
           </a:p>
@@ -3486,7 +3486,7 @@
           <a:p>
             <a:fld id="{D18B56EA-E28F-4F92-9F16-7A6F2501B303}" type="datetime8">
               <a:rPr lang="en-US" smtClean="0"/>
-              <a:t>9/8/19 8:14 PM</a:t>
+              <a:t>12/8/19 8:32 PM</a:t>
             </a:fld>
             <a:endParaRPr lang="en-US" dirty="0"/>
           </a:p>
@@ -3772,7 +3772,7 @@
                 <a:tabLst/>
                 <a:defRPr/>
               </a:pPr>
-              <a:t>9/8/19 8:14 PM</a:t>
+              <a:t>12/8/19 8:32 PM</a:t>
             </a:fld>
             <a:endParaRPr kumimoji="0" lang="en-US" sz="1200" b="0" i="0" u="none" strike="noStrike" kern="1200" cap="none" spc="0" normalizeH="0" baseline="0" noProof="0" dirty="0">
               <a:ln>
@@ -4289,7 +4289,7 @@
           <a:p>
             <a:fld id="{D18B56EA-E28F-4F92-9F16-7A6F2501B303}" type="datetime8">
               <a:rPr lang="en-US" smtClean="0"/>
-              <a:t>9/8/19 8:14 PM</a:t>
+              <a:t>12/8/19 8:32 PM</a:t>
             </a:fld>
             <a:endParaRPr lang="en-US" dirty="0"/>
           </a:p>
@@ -4657,7 +4657,7 @@
                 <a:tabLst/>
                 <a:defRPr/>
               </a:pPr>
-              <a:t>9/8/19 8:14 PM</a:t>
+              <a:t>12/8/19 8:32 PM</a:t>
             </a:fld>
             <a:endParaRPr kumimoji="0" lang="en-US" sz="1200" b="0" i="0" u="none" strike="noStrike" kern="1200" cap="none" spc="0" normalizeH="0" baseline="0" noProof="0" dirty="0">
               <a:ln>
@@ -4953,7 +4953,7 @@
           <a:p>
             <a:fld id="{D18B56EA-E28F-4F92-9F16-7A6F2501B303}" type="datetime8">
               <a:rPr lang="en-US" smtClean="0"/>
-              <a:t>9/8/19 8:14 PM</a:t>
+              <a:t>12/8/19 8:32 PM</a:t>
             </a:fld>
             <a:endParaRPr lang="en-US" dirty="0"/>
           </a:p>
@@ -5161,7 +5161,7 @@
           <a:p>
             <a:fld id="{D18B56EA-E28F-4F92-9F16-7A6F2501B303}" type="datetime8">
               <a:rPr lang="en-US" smtClean="0"/>
-              <a:t>9/8/19 8:14 PM</a:t>
+              <a:t>12/8/19 8:32 PM</a:t>
             </a:fld>
             <a:endParaRPr lang="en-US" dirty="0"/>
           </a:p>
@@ -5496,7 +5496,7 @@
                 <a:tabLst/>
                 <a:defRPr/>
               </a:pPr>
-              <a:t>9/8/19 8:14 PM</a:t>
+              <a:t>12/8/19 8:32 PM</a:t>
             </a:fld>
             <a:endParaRPr kumimoji="0" lang="en-US" sz="1200" b="0" i="0" u="none" strike="noStrike" kern="1200" cap="none" spc="0" normalizeH="0" baseline="0" noProof="0" dirty="0">
               <a:ln>
@@ -5794,7 +5794,7 @@
           <a:p>
             <a:fld id="{D18B56EA-E28F-4F92-9F16-7A6F2501B303}" type="datetime8">
               <a:rPr lang="en-US" smtClean="0"/>
-              <a:t>9/8/19 8:14 PM</a:t>
+              <a:t>12/8/19 8:32 PM</a:t>
             </a:fld>
             <a:endParaRPr lang="en-US" dirty="0"/>
           </a:p>
@@ -16277,7 +16277,11 @@
           <a:p>
             <a:r>
               <a:rPr lang="en-US" dirty="0"/>
-              <a:t>Working with Text and Formatting</a:t>
+              <a:t>Working with Text </a:t>
+            </a:r>
+            <a:r>
+              <a:rPr lang="en-US"/>
+              <a:t>and Formatting </a:t>
             </a:r>
             <a:endParaRPr lang="en-US" dirty="0">
               <a:noFill/>
@@ -25150,7 +25154,7 @@
         <p159:morph option="byObject"/>
       </p:transition>
     </mc:Choice>
-    <mc:Fallback xmlns:p14="http://schemas.microsoft.com/office/powerpoint/2010/main" xmlns:a14="http://schemas.microsoft.com/office/drawing/2010/main" xmlns="">
+    <mc:Fallback xmlns="" xmlns:a14="http://schemas.microsoft.com/office/drawing/2010/main" xmlns:p14="http://schemas.microsoft.com/office/powerpoint/2010/main">
       <p:transition spd="slow">
         <p:fade/>
       </p:transition>

</xml_diff>

<commit_message>
FY2020Q3 content refresh: Office Addins - M01 (Word)
</commit_message>
<xml_diff>
--- a/OfficeAddin/01 Building Add-ins for Microsoft Word/01 Text and Formatting in Word Add-ins.pptx
+++ b/OfficeAddin/01 Building Add-ins for Microsoft Word/01 Text and Formatting in Word Add-ins.pptx
@@ -271,7 +271,7 @@
               <a:rPr lang="en-US" smtClean="0">
                 <a:latin typeface="Segoe UI" pitchFamily="34" charset="0"/>
               </a:rPr>
-              <a:t>12/8/19 8:32 PM</a:t>
+              <a:t>3/3/20 8:30 PM</a:t>
             </a:fld>
             <a:endParaRPr lang="en-US" dirty="0">
               <a:latin typeface="Segoe UI" pitchFamily="34" charset="0"/>
@@ -565,7 +565,7 @@
           <a:p>
             <a:fld id="{D18B56EA-E28F-4F92-9F16-7A6F2501B303}" type="datetime8">
               <a:rPr lang="en-US" smtClean="0"/>
-              <a:t>12/8/19 8:32 PM</a:t>
+              <a:t>3/3/20 8:30 PM</a:t>
             </a:fld>
             <a:endParaRPr lang="en-US" dirty="0"/>
           </a:p>
@@ -1053,7 +1053,7 @@
                 <a:tabLst/>
                 <a:defRPr/>
               </a:pPr>
-              <a:t>12/8/19 8:32 PM</a:t>
+              <a:t>3/3/20 8:30 PM</a:t>
             </a:fld>
             <a:endParaRPr kumimoji="0" lang="en-US" sz="1200" b="0" i="0" u="none" strike="noStrike" kern="1200" cap="none" spc="0" normalizeH="0" baseline="0" noProof="0" dirty="0">
               <a:ln>
@@ -1446,7 +1446,7 @@
                 <a:tabLst/>
                 <a:defRPr/>
               </a:pPr>
-              <a:t>12/8/19 8:32 PM</a:t>
+              <a:t>3/3/20 8:30 PM</a:t>
             </a:fld>
             <a:endParaRPr kumimoji="0" lang="en-US" sz="1200" b="0" i="0" u="none" strike="noStrike" kern="1200" cap="none" spc="0" normalizeH="0" baseline="0" noProof="0" dirty="0">
               <a:ln>
@@ -1752,7 +1752,7 @@
           <a:p>
             <a:fld id="{D18B56EA-E28F-4F92-9F16-7A6F2501B303}" type="datetime8">
               <a:rPr lang="en-US" smtClean="0"/>
-              <a:t>12/8/19 8:32 PM</a:t>
+              <a:t>3/3/20 8:30 PM</a:t>
             </a:fld>
             <a:endParaRPr lang="en-US" dirty="0"/>
           </a:p>
@@ -2943,7 +2943,7 @@
           <a:p>
             <a:fld id="{D18B56EA-E28F-4F92-9F16-7A6F2501B303}" type="datetime8">
               <a:rPr lang="en-US" smtClean="0"/>
-              <a:t>12/8/19 8:32 PM</a:t>
+              <a:t>3/3/20 8:30 PM</a:t>
             </a:fld>
             <a:endParaRPr lang="en-US" dirty="0"/>
           </a:p>
@@ -3124,7 +3124,7 @@
           <a:p>
             <a:fld id="{D18B56EA-E28F-4F92-9F16-7A6F2501B303}" type="datetime8">
               <a:rPr lang="en-US" smtClean="0"/>
-              <a:t>12/8/19 8:32 PM</a:t>
+              <a:t>3/3/20 8:30 PM</a:t>
             </a:fld>
             <a:endParaRPr lang="en-US" dirty="0"/>
           </a:p>
@@ -3305,7 +3305,7 @@
           <a:p>
             <a:fld id="{D18B56EA-E28F-4F92-9F16-7A6F2501B303}" type="datetime8">
               <a:rPr lang="en-US" smtClean="0"/>
-              <a:t>12/8/19 8:32 PM</a:t>
+              <a:t>3/3/20 8:30 PM</a:t>
             </a:fld>
             <a:endParaRPr lang="en-US" dirty="0"/>
           </a:p>
@@ -3486,7 +3486,7 @@
           <a:p>
             <a:fld id="{D18B56EA-E28F-4F92-9F16-7A6F2501B303}" type="datetime8">
               <a:rPr lang="en-US" smtClean="0"/>
-              <a:t>12/8/19 8:32 PM</a:t>
+              <a:t>3/3/20 8:30 PM</a:t>
             </a:fld>
             <a:endParaRPr lang="en-US" dirty="0"/>
           </a:p>
@@ -3772,7 +3772,7 @@
                 <a:tabLst/>
                 <a:defRPr/>
               </a:pPr>
-              <a:t>12/8/19 8:32 PM</a:t>
+              <a:t>3/3/20 8:30 PM</a:t>
             </a:fld>
             <a:endParaRPr kumimoji="0" lang="en-US" sz="1200" b="0" i="0" u="none" strike="noStrike" kern="1200" cap="none" spc="0" normalizeH="0" baseline="0" noProof="0" dirty="0">
               <a:ln>
@@ -4289,7 +4289,7 @@
           <a:p>
             <a:fld id="{D18B56EA-E28F-4F92-9F16-7A6F2501B303}" type="datetime8">
               <a:rPr lang="en-US" smtClean="0"/>
-              <a:t>12/8/19 8:32 PM</a:t>
+              <a:t>3/3/20 8:30 PM</a:t>
             </a:fld>
             <a:endParaRPr lang="en-US" dirty="0"/>
           </a:p>
@@ -4657,7 +4657,7 @@
                 <a:tabLst/>
                 <a:defRPr/>
               </a:pPr>
-              <a:t>12/8/19 8:32 PM</a:t>
+              <a:t>3/3/20 8:30 PM</a:t>
             </a:fld>
             <a:endParaRPr kumimoji="0" lang="en-US" sz="1200" b="0" i="0" u="none" strike="noStrike" kern="1200" cap="none" spc="0" normalizeH="0" baseline="0" noProof="0" dirty="0">
               <a:ln>
@@ -4953,7 +4953,7 @@
           <a:p>
             <a:fld id="{D18B56EA-E28F-4F92-9F16-7A6F2501B303}" type="datetime8">
               <a:rPr lang="en-US" smtClean="0"/>
-              <a:t>12/8/19 8:32 PM</a:t>
+              <a:t>3/3/20 8:30 PM</a:t>
             </a:fld>
             <a:endParaRPr lang="en-US" dirty="0"/>
           </a:p>
@@ -5161,7 +5161,7 @@
           <a:p>
             <a:fld id="{D18B56EA-E28F-4F92-9F16-7A6F2501B303}" type="datetime8">
               <a:rPr lang="en-US" smtClean="0"/>
-              <a:t>12/8/19 8:32 PM</a:t>
+              <a:t>3/3/20 8:30 PM</a:t>
             </a:fld>
             <a:endParaRPr lang="en-US" dirty="0"/>
           </a:p>
@@ -5496,7 +5496,7 @@
                 <a:tabLst/>
                 <a:defRPr/>
               </a:pPr>
-              <a:t>12/8/19 8:32 PM</a:t>
+              <a:t>3/3/20 8:30 PM</a:t>
             </a:fld>
             <a:endParaRPr kumimoji="0" lang="en-US" sz="1200" b="0" i="0" u="none" strike="noStrike" kern="1200" cap="none" spc="0" normalizeH="0" baseline="0" noProof="0" dirty="0">
               <a:ln>
@@ -5794,7 +5794,7 @@
           <a:p>
             <a:fld id="{D18B56EA-E28F-4F92-9F16-7A6F2501B303}" type="datetime8">
               <a:rPr lang="en-US" smtClean="0"/>
-              <a:t>12/8/19 8:32 PM</a:t>
+              <a:t>3/3/20 8:30 PM</a:t>
             </a:fld>
             <a:endParaRPr lang="en-US" dirty="0"/>
           </a:p>
@@ -19000,7 +19000,7 @@
               <a:rPr lang="en-US" sz="1800" dirty="0">
                 <a:latin typeface="+mj-lt"/>
               </a:rPr>
-              <a:t>Paragraph object</a:t>
+              <a:t>Paragraph object </a:t>
             </a:r>
           </a:p>
           <a:p>
@@ -19020,7 +19020,7 @@
               </a:rPr>
               <a:t>https://docs.microsoft.com/en-us/javascript/api/word/word.paragraph</a:t>
             </a:r>
-            <a:endParaRPr lang="en-US" sz="1800">
+            <a:endParaRPr lang="en-US" sz="1800" dirty="0">
               <a:latin typeface="+mj-lt"/>
             </a:endParaRPr>
           </a:p>
@@ -25154,7 +25154,7 @@
         <p159:morph option="byObject"/>
       </p:transition>
     </mc:Choice>
-    <mc:Fallback xmlns="" xmlns:a14="http://schemas.microsoft.com/office/drawing/2010/main" xmlns:p14="http://schemas.microsoft.com/office/powerpoint/2010/main">
+    <mc:Fallback xmlns:p14="http://schemas.microsoft.com/office/powerpoint/2010/main" xmlns:a14="http://schemas.microsoft.com/office/drawing/2010/main" xmlns="">
       <p:transition spd="slow">
         <p:fade/>
       </p:transition>

</xml_diff>

<commit_message>
FY2020Q3 content refresh: Office Addins - M01 (Word) (#674)
</commit_message>
<xml_diff>
--- a/OfficeAddin/01 Building Add-ins for Microsoft Word/01 Text and Formatting in Word Add-ins.pptx
+++ b/OfficeAddin/01 Building Add-ins for Microsoft Word/01 Text and Formatting in Word Add-ins.pptx
@@ -271,7 +271,7 @@
               <a:rPr lang="en-US" smtClean="0">
                 <a:latin typeface="Segoe UI" pitchFamily="34" charset="0"/>
               </a:rPr>
-              <a:t>12/8/19 8:32 PM</a:t>
+              <a:t>3/3/20 8:30 PM</a:t>
             </a:fld>
             <a:endParaRPr lang="en-US" dirty="0">
               <a:latin typeface="Segoe UI" pitchFamily="34" charset="0"/>
@@ -565,7 +565,7 @@
           <a:p>
             <a:fld id="{D18B56EA-E28F-4F92-9F16-7A6F2501B303}" type="datetime8">
               <a:rPr lang="en-US" smtClean="0"/>
-              <a:t>12/8/19 8:32 PM</a:t>
+              <a:t>3/3/20 8:30 PM</a:t>
             </a:fld>
             <a:endParaRPr lang="en-US" dirty="0"/>
           </a:p>
@@ -1053,7 +1053,7 @@
                 <a:tabLst/>
                 <a:defRPr/>
               </a:pPr>
-              <a:t>12/8/19 8:32 PM</a:t>
+              <a:t>3/3/20 8:30 PM</a:t>
             </a:fld>
             <a:endParaRPr kumimoji="0" lang="en-US" sz="1200" b="0" i="0" u="none" strike="noStrike" kern="1200" cap="none" spc="0" normalizeH="0" baseline="0" noProof="0" dirty="0">
               <a:ln>
@@ -1446,7 +1446,7 @@
                 <a:tabLst/>
                 <a:defRPr/>
               </a:pPr>
-              <a:t>12/8/19 8:32 PM</a:t>
+              <a:t>3/3/20 8:30 PM</a:t>
             </a:fld>
             <a:endParaRPr kumimoji="0" lang="en-US" sz="1200" b="0" i="0" u="none" strike="noStrike" kern="1200" cap="none" spc="0" normalizeH="0" baseline="0" noProof="0" dirty="0">
               <a:ln>
@@ -1752,7 +1752,7 @@
           <a:p>
             <a:fld id="{D18B56EA-E28F-4F92-9F16-7A6F2501B303}" type="datetime8">
               <a:rPr lang="en-US" smtClean="0"/>
-              <a:t>12/8/19 8:32 PM</a:t>
+              <a:t>3/3/20 8:30 PM</a:t>
             </a:fld>
             <a:endParaRPr lang="en-US" dirty="0"/>
           </a:p>
@@ -2943,7 +2943,7 @@
           <a:p>
             <a:fld id="{D18B56EA-E28F-4F92-9F16-7A6F2501B303}" type="datetime8">
               <a:rPr lang="en-US" smtClean="0"/>
-              <a:t>12/8/19 8:32 PM</a:t>
+              <a:t>3/3/20 8:30 PM</a:t>
             </a:fld>
             <a:endParaRPr lang="en-US" dirty="0"/>
           </a:p>
@@ -3124,7 +3124,7 @@
           <a:p>
             <a:fld id="{D18B56EA-E28F-4F92-9F16-7A6F2501B303}" type="datetime8">
               <a:rPr lang="en-US" smtClean="0"/>
-              <a:t>12/8/19 8:32 PM</a:t>
+              <a:t>3/3/20 8:30 PM</a:t>
             </a:fld>
             <a:endParaRPr lang="en-US" dirty="0"/>
           </a:p>
@@ -3305,7 +3305,7 @@
           <a:p>
             <a:fld id="{D18B56EA-E28F-4F92-9F16-7A6F2501B303}" type="datetime8">
               <a:rPr lang="en-US" smtClean="0"/>
-              <a:t>12/8/19 8:32 PM</a:t>
+              <a:t>3/3/20 8:30 PM</a:t>
             </a:fld>
             <a:endParaRPr lang="en-US" dirty="0"/>
           </a:p>
@@ -3486,7 +3486,7 @@
           <a:p>
             <a:fld id="{D18B56EA-E28F-4F92-9F16-7A6F2501B303}" type="datetime8">
               <a:rPr lang="en-US" smtClean="0"/>
-              <a:t>12/8/19 8:32 PM</a:t>
+              <a:t>3/3/20 8:30 PM</a:t>
             </a:fld>
             <a:endParaRPr lang="en-US" dirty="0"/>
           </a:p>
@@ -3772,7 +3772,7 @@
                 <a:tabLst/>
                 <a:defRPr/>
               </a:pPr>
-              <a:t>12/8/19 8:32 PM</a:t>
+              <a:t>3/3/20 8:30 PM</a:t>
             </a:fld>
             <a:endParaRPr kumimoji="0" lang="en-US" sz="1200" b="0" i="0" u="none" strike="noStrike" kern="1200" cap="none" spc="0" normalizeH="0" baseline="0" noProof="0" dirty="0">
               <a:ln>
@@ -4289,7 +4289,7 @@
           <a:p>
             <a:fld id="{D18B56EA-E28F-4F92-9F16-7A6F2501B303}" type="datetime8">
               <a:rPr lang="en-US" smtClean="0"/>
-              <a:t>12/8/19 8:32 PM</a:t>
+              <a:t>3/3/20 8:30 PM</a:t>
             </a:fld>
             <a:endParaRPr lang="en-US" dirty="0"/>
           </a:p>
@@ -4657,7 +4657,7 @@
                 <a:tabLst/>
                 <a:defRPr/>
               </a:pPr>
-              <a:t>12/8/19 8:32 PM</a:t>
+              <a:t>3/3/20 8:30 PM</a:t>
             </a:fld>
             <a:endParaRPr kumimoji="0" lang="en-US" sz="1200" b="0" i="0" u="none" strike="noStrike" kern="1200" cap="none" spc="0" normalizeH="0" baseline="0" noProof="0" dirty="0">
               <a:ln>
@@ -4953,7 +4953,7 @@
           <a:p>
             <a:fld id="{D18B56EA-E28F-4F92-9F16-7A6F2501B303}" type="datetime8">
               <a:rPr lang="en-US" smtClean="0"/>
-              <a:t>12/8/19 8:32 PM</a:t>
+              <a:t>3/3/20 8:30 PM</a:t>
             </a:fld>
             <a:endParaRPr lang="en-US" dirty="0"/>
           </a:p>
@@ -5161,7 +5161,7 @@
           <a:p>
             <a:fld id="{D18B56EA-E28F-4F92-9F16-7A6F2501B303}" type="datetime8">
               <a:rPr lang="en-US" smtClean="0"/>
-              <a:t>12/8/19 8:32 PM</a:t>
+              <a:t>3/3/20 8:30 PM</a:t>
             </a:fld>
             <a:endParaRPr lang="en-US" dirty="0"/>
           </a:p>
@@ -5496,7 +5496,7 @@
                 <a:tabLst/>
                 <a:defRPr/>
               </a:pPr>
-              <a:t>12/8/19 8:32 PM</a:t>
+              <a:t>3/3/20 8:30 PM</a:t>
             </a:fld>
             <a:endParaRPr kumimoji="0" lang="en-US" sz="1200" b="0" i="0" u="none" strike="noStrike" kern="1200" cap="none" spc="0" normalizeH="0" baseline="0" noProof="0" dirty="0">
               <a:ln>
@@ -5794,7 +5794,7 @@
           <a:p>
             <a:fld id="{D18B56EA-E28F-4F92-9F16-7A6F2501B303}" type="datetime8">
               <a:rPr lang="en-US" smtClean="0"/>
-              <a:t>12/8/19 8:32 PM</a:t>
+              <a:t>3/3/20 8:30 PM</a:t>
             </a:fld>
             <a:endParaRPr lang="en-US" dirty="0"/>
           </a:p>
@@ -19000,7 +19000,7 @@
               <a:rPr lang="en-US" sz="1800" dirty="0">
                 <a:latin typeface="+mj-lt"/>
               </a:rPr>
-              <a:t>Paragraph object</a:t>
+              <a:t>Paragraph object </a:t>
             </a:r>
           </a:p>
           <a:p>
@@ -19020,7 +19020,7 @@
               </a:rPr>
               <a:t>https://docs.microsoft.com/en-us/javascript/api/word/word.paragraph</a:t>
             </a:r>
-            <a:endParaRPr lang="en-US" sz="1800">
+            <a:endParaRPr lang="en-US" sz="1800" dirty="0">
               <a:latin typeface="+mj-lt"/>
             </a:endParaRPr>
           </a:p>
@@ -25154,7 +25154,7 @@
         <p159:morph option="byObject"/>
       </p:transition>
     </mc:Choice>
-    <mc:Fallback xmlns="" xmlns:a14="http://schemas.microsoft.com/office/drawing/2010/main" xmlns:p14="http://schemas.microsoft.com/office/powerpoint/2010/main">
+    <mc:Fallback xmlns:p14="http://schemas.microsoft.com/office/powerpoint/2010/main" xmlns:a14="http://schemas.microsoft.com/office/drawing/2010/main" xmlns="">
       <p:transition spd="slow">
         <p:fade/>
       </p:transition>

</xml_diff>

<commit_message>
Port module to Microsoft Learn format (OfficeAddin): "Build Office add-ins for Microsoft Word"
</commit_message>
<xml_diff>
--- a/OfficeAddin/01 Building Add-ins for Microsoft Word/01 Text and Formatting in Word Add-ins.pptx
+++ b/OfficeAddin/01 Building Add-ins for Microsoft Word/01 Text and Formatting in Word Add-ins.pptx
@@ -271,7 +271,7 @@
               <a:rPr lang="en-US" smtClean="0">
                 <a:latin typeface="Segoe UI" pitchFamily="34" charset="0"/>
               </a:rPr>
-              <a:t>3/3/20 8:30 PM</a:t>
+              <a:t>3/30/20 3:59 PM</a:t>
             </a:fld>
             <a:endParaRPr lang="en-US" dirty="0">
               <a:latin typeface="Segoe UI" pitchFamily="34" charset="0"/>
@@ -565,7 +565,7 @@
           <a:p>
             <a:fld id="{D18B56EA-E28F-4F92-9F16-7A6F2501B303}" type="datetime8">
               <a:rPr lang="en-US" smtClean="0"/>
-              <a:t>3/3/20 8:30 PM</a:t>
+              <a:t>3/30/20 3:59 PM</a:t>
             </a:fld>
             <a:endParaRPr lang="en-US" dirty="0"/>
           </a:p>
@@ -854,6 +854,21 @@
           <a:bodyPr/>
           <a:lstStyle/>
           <a:p>
+            <a:r>
+              <a:rPr lang="en-US" dirty="0"/>
+              <a:t>Microsoft Office clients enable developers to create add-ins that extend Microsoft Word with custom functionality. Through a JavaScript API, developers can manipulate the content in a Word document from an app running in the task pane.</a:t>
+            </a:r>
+          </a:p>
+          <a:p>
+            <a:endParaRPr lang="en-US" dirty="0"/>
+          </a:p>
+          <a:p>
+            <a:r>
+              <a:rPr lang="en-US" dirty="0"/>
+              <a:t>In this module, you'll learn how to build a Word add-in that inserts (and replaces) text ranges, paragraphs, images, HTML, tables, and content controls. You'll also learn how to format text and how to insert (and replace) content in content controls.</a:t>
+            </a:r>
+          </a:p>
+          <a:p>
             <a:endParaRPr lang="en-US" dirty="0"/>
           </a:p>
         </p:txBody>
@@ -1053,7 +1068,7 @@
                 <a:tabLst/>
                 <a:defRPr/>
               </a:pPr>
-              <a:t>3/3/20 8:30 PM</a:t>
+              <a:t>3/30/20 3:59 PM</a:t>
             </a:fld>
             <a:endParaRPr kumimoji="0" lang="en-US" sz="1200" b="0" i="0" u="none" strike="noStrike" kern="1200" cap="none" spc="0" normalizeH="0" baseline="0" noProof="0" dirty="0">
               <a:ln>
@@ -1213,39 +1228,150 @@
           <a:lstStyle/>
           <a:p>
             <a:r>
-              <a:rPr lang="en-US" dirty="0"/>
-              <a:t>When working with Office add-ins, you will often here the term range.</a:t>
-            </a:r>
-          </a:p>
-          <a:p>
-            <a:r>
-              <a:rPr lang="en-US" dirty="0"/>
-              <a:t>A range in Microsoft Word is any contiguous area of a document.</a:t>
-            </a:r>
-          </a:p>
-          <a:p>
-            <a:r>
-              <a:rPr lang="en-US" dirty="0"/>
-              <a:t>Ranges can be established in a number of ways, including search, selection, and conversion from another </a:t>
-            </a:r>
-            <a:r>
-              <a:rPr lang="en-US" dirty="0" err="1"/>
-              <a:t>Office.js</a:t>
-            </a:r>
-            <a:r>
-              <a:rPr lang="en-US" dirty="0"/>
-              <a:t> object such as a paragraph</a:t>
-            </a:r>
-          </a:p>
-          <a:p>
-            <a:r>
-              <a:rPr lang="en-US" dirty="0"/>
-              <a:t>Selections allow you to manipulate both the content and location of focus in a document.</a:t>
-            </a:r>
-          </a:p>
-          <a:p>
-            <a:r>
-              <a:rPr lang="en-US" dirty="0"/>
+              <a:rPr lang="en-US" sz="900" b="0" kern="1200" dirty="0">
+                <a:solidFill>
+                  <a:schemeClr val="tx1"/>
+                </a:solidFill>
+                <a:effectLst/>
+                <a:latin typeface="Segoe UI Light" pitchFamily="34" charset="0"/>
+                <a:ea typeface="+mn-ea"/>
+                <a:cs typeface="+mn-cs"/>
+              </a:rPr>
+              <a:t>When working with Office add-ins, developers will often hear the term </a:t>
+            </a:r>
+            <a:r>
+              <a:rPr lang="en-US" sz="900" b="0" i="1" kern="1200" dirty="0">
+                <a:solidFill>
+                  <a:schemeClr val="tx1"/>
+                </a:solidFill>
+                <a:effectLst/>
+                <a:latin typeface="Segoe UI Light" pitchFamily="34" charset="0"/>
+                <a:ea typeface="+mn-ea"/>
+                <a:cs typeface="+mn-cs"/>
+              </a:rPr>
+              <a:t>*range*</a:t>
+            </a:r>
+            <a:r>
+              <a:rPr lang="en-US" sz="900" b="0" kern="1200" dirty="0">
+                <a:solidFill>
+                  <a:schemeClr val="tx1"/>
+                </a:solidFill>
+                <a:effectLst/>
+                <a:latin typeface="Segoe UI Light" pitchFamily="34" charset="0"/>
+                <a:ea typeface="+mn-ea"/>
+                <a:cs typeface="+mn-cs"/>
+              </a:rPr>
+              <a:t>. A range is any contiguous area of a document in Microsoft Word.</a:t>
+            </a:r>
+          </a:p>
+          <a:p>
+            <a:br>
+              <a:rPr lang="en-US" sz="900" b="0" kern="1200" dirty="0">
+                <a:solidFill>
+                  <a:schemeClr val="tx1"/>
+                </a:solidFill>
+                <a:effectLst/>
+                <a:latin typeface="Segoe UI Light" pitchFamily="34" charset="0"/>
+                <a:ea typeface="+mn-ea"/>
+                <a:cs typeface="+mn-cs"/>
+              </a:rPr>
+            </a:br>
+            <a:r>
+              <a:rPr lang="en-US" sz="900" b="0" kern="1200" dirty="0">
+                <a:solidFill>
+                  <a:schemeClr val="tx1"/>
+                </a:solidFill>
+                <a:effectLst/>
+                <a:latin typeface="Segoe UI Light" pitchFamily="34" charset="0"/>
+                <a:ea typeface="+mn-ea"/>
+                <a:cs typeface="+mn-cs"/>
+              </a:rPr>
+              <a:t>Ranges can be established through a number of ways, including search, selection, or through a conversion. For example, the `</a:t>
+            </a:r>
+            <a:r>
+              <a:rPr lang="en-US" sz="900" b="0" kern="1200" dirty="0" err="1">
+                <a:solidFill>
+                  <a:schemeClr val="tx1"/>
+                </a:solidFill>
+                <a:effectLst/>
+                <a:latin typeface="Segoe UI Light" pitchFamily="34" charset="0"/>
+                <a:ea typeface="+mn-ea"/>
+                <a:cs typeface="+mn-cs"/>
+              </a:rPr>
+              <a:t>paragraph.getRange</a:t>
+            </a:r>
+            <a:r>
+              <a:rPr lang="en-US" sz="900" b="0" kern="1200" dirty="0">
+                <a:solidFill>
+                  <a:schemeClr val="tx1"/>
+                </a:solidFill>
+                <a:effectLst/>
+                <a:latin typeface="Segoe UI Light" pitchFamily="34" charset="0"/>
+                <a:ea typeface="+mn-ea"/>
+                <a:cs typeface="+mn-cs"/>
+              </a:rPr>
+              <a:t>()` method will return the paragraph as a range.</a:t>
+            </a:r>
+          </a:p>
+          <a:p>
+            <a:br>
+              <a:rPr lang="en-US" sz="900" b="0" kern="1200" dirty="0">
+                <a:solidFill>
+                  <a:schemeClr val="tx1"/>
+                </a:solidFill>
+                <a:effectLst/>
+                <a:latin typeface="Segoe UI Light" pitchFamily="34" charset="0"/>
+                <a:ea typeface="+mn-ea"/>
+                <a:cs typeface="+mn-cs"/>
+              </a:rPr>
+            </a:br>
+            <a:r>
+              <a:rPr lang="en-US" sz="900" b="0" i="1" kern="1200" dirty="0">
+                <a:solidFill>
+                  <a:schemeClr val="tx1"/>
+                </a:solidFill>
+                <a:effectLst/>
+                <a:latin typeface="Segoe UI Light" pitchFamily="34" charset="0"/>
+                <a:ea typeface="+mn-ea"/>
+                <a:cs typeface="+mn-cs"/>
+              </a:rPr>
+              <a:t>*Selections*</a:t>
+            </a:r>
+            <a:r>
+              <a:rPr lang="en-US" sz="900" b="0" kern="1200" dirty="0">
+                <a:solidFill>
+                  <a:schemeClr val="tx1"/>
+                </a:solidFill>
+                <a:effectLst/>
+                <a:latin typeface="Segoe UI Light" pitchFamily="34" charset="0"/>
+                <a:ea typeface="+mn-ea"/>
+                <a:cs typeface="+mn-cs"/>
+              </a:rPr>
+              <a:t> allow you to manipulate both the content and location of focus in a document.</a:t>
+            </a:r>
+          </a:p>
+          <a:p>
+            <a:br>
+              <a:rPr lang="en-US" sz="900" b="0" kern="1200" dirty="0">
+                <a:solidFill>
+                  <a:schemeClr val="tx1"/>
+                </a:solidFill>
+                <a:effectLst/>
+                <a:latin typeface="Segoe UI Light" pitchFamily="34" charset="0"/>
+                <a:ea typeface="+mn-ea"/>
+                <a:cs typeface="+mn-cs"/>
+              </a:rPr>
+            </a:br>
+            <a:r>
+              <a:rPr lang="en-US" sz="900" b="0" kern="1200" dirty="0">
+                <a:solidFill>
+                  <a:schemeClr val="tx1"/>
+                </a:solidFill>
+                <a:effectLst/>
+                <a:latin typeface="Segoe UI Light" pitchFamily="34" charset="0"/>
+                <a:ea typeface="+mn-ea"/>
+                <a:cs typeface="+mn-cs"/>
+              </a:rPr>
               <a:t>You can get the selection of a range or set the selection on a range</a:t>
             </a:r>
           </a:p>
@@ -1446,7 +1572,7 @@
                 <a:tabLst/>
                 <a:defRPr/>
               </a:pPr>
-              <a:t>3/3/20 8:30 PM</a:t>
+              <a:t>3/30/20 4:05 PM</a:t>
             </a:fld>
             <a:endParaRPr kumimoji="0" lang="en-US" sz="1200" b="0" i="0" u="none" strike="noStrike" kern="1200" cap="none" spc="0" normalizeH="0" baseline="0" noProof="0" dirty="0">
               <a:ln>
@@ -1752,7 +1878,7 @@
           <a:p>
             <a:fld id="{D18B56EA-E28F-4F92-9F16-7A6F2501B303}" type="datetime8">
               <a:rPr lang="en-US" smtClean="0"/>
-              <a:t>3/3/20 8:30 PM</a:t>
+              <a:t>3/30/20 3:59 PM</a:t>
             </a:fld>
             <a:endParaRPr lang="en-US" dirty="0"/>
           </a:p>
@@ -2943,7 +3069,7 @@
           <a:p>
             <a:fld id="{D18B56EA-E28F-4F92-9F16-7A6F2501B303}" type="datetime8">
               <a:rPr lang="en-US" smtClean="0"/>
-              <a:t>3/3/20 8:30 PM</a:t>
+              <a:t>3/30/20 3:59 PM</a:t>
             </a:fld>
             <a:endParaRPr lang="en-US" dirty="0"/>
           </a:p>
@@ -3124,7 +3250,7 @@
           <a:p>
             <a:fld id="{D18B56EA-E28F-4F92-9F16-7A6F2501B303}" type="datetime8">
               <a:rPr lang="en-US" smtClean="0"/>
-              <a:t>3/3/20 8:30 PM</a:t>
+              <a:t>3/30/20 3:59 PM</a:t>
             </a:fld>
             <a:endParaRPr lang="en-US" dirty="0"/>
           </a:p>
@@ -3305,7 +3431,7 @@
           <a:p>
             <a:fld id="{D18B56EA-E28F-4F92-9F16-7A6F2501B303}" type="datetime8">
               <a:rPr lang="en-US" smtClean="0"/>
-              <a:t>3/3/20 8:30 PM</a:t>
+              <a:t>3/30/20 3:59 PM</a:t>
             </a:fld>
             <a:endParaRPr lang="en-US" dirty="0"/>
           </a:p>
@@ -3486,7 +3612,7 @@
           <a:p>
             <a:fld id="{D18B56EA-E28F-4F92-9F16-7A6F2501B303}" type="datetime8">
               <a:rPr lang="en-US" smtClean="0"/>
-              <a:t>3/3/20 8:30 PM</a:t>
+              <a:t>3/30/20 3:59 PM</a:t>
             </a:fld>
             <a:endParaRPr lang="en-US" dirty="0"/>
           </a:p>
@@ -3573,6 +3699,12 @@
           <a:bodyPr/>
           <a:lstStyle/>
           <a:p>
+            <a:r>
+              <a:rPr lang="en-US" dirty="0"/>
+              <a:t>The Word JavaScript API facilitates programmatic control over text, formatting, selections and ranges in Word documents. In this unit, you'll learn how to work with text, paragraphs, apply styles and formatting to text, and how to work with selections and ranges of text from a custom Word add-in.</a:t>
+            </a:r>
+          </a:p>
+          <a:p>
             <a:endParaRPr lang="en-US" dirty="0"/>
           </a:p>
         </p:txBody>
@@ -3772,7 +3904,7 @@
                 <a:tabLst/>
                 <a:defRPr/>
               </a:pPr>
-              <a:t>3/3/20 8:30 PM</a:t>
+              <a:t>3/30/20 3:59 PM</a:t>
             </a:fld>
             <a:endParaRPr kumimoji="0" lang="en-US" sz="1200" b="0" i="0" u="none" strike="noStrike" kern="1200" cap="none" spc="0" normalizeH="0" baseline="0" noProof="0" dirty="0">
               <a:ln>
@@ -4022,7 +4154,34 @@
           <a:p>
             <a:r>
               <a:rPr lang="en-US" dirty="0"/>
-              <a:t>The Office 365 Platform offers a number of canvases for developers to embed customizations. Office add-ins are one of those canvases.</a:t>
+              <a:t>The Microsoft Office 365 platform offers a number of canvases for developers to embed customizations and Office add-ins are one of three canvases: documents, conversations  and pages.</a:t>
+            </a:r>
+          </a:p>
+          <a:p>
+            <a:endParaRPr lang="en-US" dirty="0"/>
+          </a:p>
+          <a:p>
+            <a:r>
+              <a:rPr lang="en-US" dirty="0"/>
+              <a:t>Microsoft Teams facilitates conversations between users and enables developers to extend the experience using messaging extensions, conversational bots, and other customization options.</a:t>
+            </a:r>
+          </a:p>
+          <a:p>
+            <a:endParaRPr lang="en-US" dirty="0"/>
+          </a:p>
+          <a:p>
+            <a:r>
+              <a:rPr lang="en-US" dirty="0"/>
+              <a:t>Developers customize pages in SharePoint Server and SharePoint online using the SharePoint Framework.</a:t>
+            </a:r>
+          </a:p>
+          <a:p>
+            <a:endParaRPr lang="en-US" dirty="0"/>
+          </a:p>
+          <a:p>
+            <a:r>
+              <a:rPr lang="en-US" dirty="0"/>
+              <a:t>Office clients, such as Word, Excel, PowerPoint, OneNote, and Outlook can also be extended to implement custom task panes, actions, and additional customizations using add-ins.</a:t>
             </a:r>
           </a:p>
         </p:txBody>
@@ -4090,15 +4249,15 @@
             </a:pPr>
             <a:r>
               <a:rPr lang="en-US" dirty="0"/>
-              <a:t>All Office add-ins must call </a:t>
-            </a:r>
-            <a:r>
-              <a:rPr lang="en-US" dirty="0" err="1"/>
-              <a:t>Office.initialize</a:t>
-            </a:r>
-            <a:r>
-              <a:rPr lang="en-US" dirty="0"/>
-              <a:t> when a page first loads in the add-in</a:t>
+              <a:t>We'll start by looking at an anatomy of an </a:t>
+            </a:r>
+            <a:r>
+              <a:rPr lang="en-US" dirty="0" err="1"/>
+              <a:t>Office.js</a:t>
+            </a:r>
+            <a:r>
+              <a:rPr lang="en-US" dirty="0"/>
+              <a:t> for Microsoft Word:</a:t>
             </a:r>
           </a:p>
           <a:p>
@@ -4106,44 +4265,14 @@
               <a:buFont typeface="+mj-lt"/>
               <a:buAutoNum type="arabicPeriod"/>
             </a:pPr>
-            <a:r>
-              <a:rPr lang="en-US" dirty="0"/>
-              <a:t>If using newer </a:t>
-            </a:r>
-            <a:r>
-              <a:rPr lang="en-US" dirty="0" err="1"/>
-              <a:t>Office.js</a:t>
-            </a:r>
-            <a:r>
-              <a:rPr lang="en-US" dirty="0"/>
-              <a:t> capabilities, it is important to check if the client supports those extensions. You can check this using the </a:t>
-            </a:r>
-            <a:r>
-              <a:rPr lang="en-US" dirty="0" err="1"/>
-              <a:t>requirements.isSetSupported</a:t>
-            </a:r>
-            <a:r>
-              <a:rPr lang="en-US" dirty="0"/>
-              <a:t> operation.</a:t>
-            </a:r>
+            <a:endParaRPr lang="en-US" dirty="0"/>
           </a:p>
           <a:p>
             <a:pPr marL="228600" indent="-228600">
               <a:buFont typeface="+mj-lt"/>
               <a:buAutoNum type="arabicPeriod"/>
             </a:pPr>
-            <a:r>
-              <a:rPr lang="en-US" dirty="0"/>
-              <a:t>For Word JavaScript APIs, you should get context using the </a:t>
-            </a:r>
-            <a:r>
-              <a:rPr lang="en-US" dirty="0" err="1"/>
-              <a:t>Word.run</a:t>
-            </a:r>
-            <a:r>
-              <a:rPr lang="en-US" dirty="0"/>
-              <a:t> operation.</a:t>
-            </a:r>
+            <a:endParaRPr lang="en-US" dirty="0"/>
           </a:p>
           <a:p>
             <a:pPr marL="228600" indent="-228600">
@@ -4152,7 +4281,15 @@
             </a:pPr>
             <a:r>
               <a:rPr lang="en-US" dirty="0"/>
-              <a:t>Using the context, you can load any properties you might need to work with.</a:t>
+              <a:t>- All Office add-ins must call off the `</a:t>
+            </a:r>
+            <a:r>
+              <a:rPr lang="en-US" dirty="0" err="1"/>
+              <a:t>Office.initialize</a:t>
+            </a:r>
+            <a:r>
+              <a:rPr lang="en-US" dirty="0"/>
+              <a:t>()` method when a page first loads the add-in.</a:t>
             </a:r>
           </a:p>
           <a:p>
@@ -4162,15 +4299,15 @@
             </a:pPr>
             <a:r>
               <a:rPr lang="en-US" dirty="0"/>
-              <a:t>Calling </a:t>
-            </a:r>
-            <a:r>
-              <a:rPr lang="en-US" dirty="0" err="1"/>
-              <a:t>context.sync</a:t>
-            </a:r>
-            <a:r>
-              <a:rPr lang="en-US" dirty="0"/>
-              <a:t> will execute a batch of operations.</a:t>
+              <a:t>- If you're using a newer </a:t>
+            </a:r>
+            <a:r>
+              <a:rPr lang="en-US" dirty="0" err="1"/>
+              <a:t>Office.js</a:t>
+            </a:r>
+            <a:r>
+              <a:rPr lang="en-US" dirty="0"/>
+              <a:t> capability in your add-in, its important to check if the client supports those extensions and you can check that using the `requirements` object.</a:t>
             </a:r>
           </a:p>
           <a:p>
@@ -4179,12 +4316,16 @@
               <a:buAutoNum type="arabicPeriod"/>
             </a:pPr>
             <a:r>
-              <a:rPr lang="en-US" dirty="0" err="1"/>
-              <a:t>Context.sync</a:t>
-            </a:r>
-            <a:r>
-              <a:rPr lang="en-US" dirty="0"/>
-              <a:t> returns a promise that can be used to get results or a previous operation and/or perform new operations.</a:t>
+              <a:rPr lang="en-US" dirty="0"/>
+              <a:t>- For the Word JavaScript APIs, you will use the `</a:t>
+            </a:r>
+            <a:r>
+              <a:rPr lang="en-US" dirty="0" err="1"/>
+              <a:t>Word.run</a:t>
+            </a:r>
+            <a:r>
+              <a:rPr lang="en-US" dirty="0"/>
+              <a:t>()` method to get an instance of the current document `context`.</a:t>
             </a:r>
           </a:p>
           <a:p>
@@ -4194,7 +4335,61 @@
             </a:pPr>
             <a:r>
               <a:rPr lang="en-US" dirty="0"/>
-              <a:t>It is a best practice to catch and handle errors that might occur when working with the Word APIs</a:t>
+              <a:t>- Once you have a reference to the current Word document's `context`, you can load any properties on the context using the `load()` method. This method will add the request queue, allowing you to chain multiple requests together for performance reasons.</a:t>
+            </a:r>
+          </a:p>
+          <a:p>
+            <a:pPr marL="228600" indent="-228600">
+              <a:buFont typeface="+mj-lt"/>
+              <a:buAutoNum type="arabicPeriod"/>
+            </a:pPr>
+            <a:r>
+              <a:rPr lang="en-US" dirty="0"/>
+              <a:t>- When you're ready to retrieve the properties you queued up, or to perform any queued actions, use </a:t>
+            </a:r>
+            <a:r>
+              <a:rPr lang="en-US" dirty="0" err="1"/>
+              <a:t>the`context.sync</a:t>
+            </a:r>
+            <a:r>
+              <a:rPr lang="en-US" dirty="0"/>
+              <a:t>()` method to execute the batch of queued operations defined using the `load()` method.</a:t>
+            </a:r>
+          </a:p>
+          <a:p>
+            <a:pPr marL="228600" indent="-228600">
+              <a:buFont typeface="+mj-lt"/>
+              <a:buAutoNum type="arabicPeriod"/>
+            </a:pPr>
+            <a:r>
+              <a:rPr lang="en-US" dirty="0"/>
+              <a:t>- The `</a:t>
+            </a:r>
+            <a:r>
+              <a:rPr lang="en-US" dirty="0" err="1"/>
+              <a:t>context.sync</a:t>
+            </a:r>
+            <a:r>
+              <a:rPr lang="en-US" dirty="0"/>
+              <a:t>()` method returns a JavaScript promise that can be used to get results or a previous operation and/or perform new operations.</a:t>
+            </a:r>
+          </a:p>
+          <a:p>
+            <a:pPr marL="228600" indent="-228600">
+              <a:buFont typeface="+mj-lt"/>
+              <a:buAutoNum type="arabicPeriod"/>
+            </a:pPr>
+            <a:r>
+              <a:rPr lang="en-US" dirty="0"/>
+              <a:t>- As a best practice, you should listen for, catch, and handle any errors that might occur when working with the Word </a:t>
+            </a:r>
+            <a:r>
+              <a:rPr lang="en-US" dirty="0" err="1"/>
+              <a:t>JavaScriopt</a:t>
+            </a:r>
+            <a:r>
+              <a:rPr lang="en-US" dirty="0"/>
+              <a:t> APIs.</a:t>
             </a:r>
           </a:p>
         </p:txBody>
@@ -4289,7 +4484,7 @@
           <a:p>
             <a:fld id="{D18B56EA-E28F-4F92-9F16-7A6F2501B303}" type="datetime8">
               <a:rPr lang="en-US" smtClean="0"/>
-              <a:t>3/3/20 8:30 PM</a:t>
+              <a:t>3/30/20 3:59 PM</a:t>
             </a:fld>
             <a:endParaRPr lang="en-US" dirty="0"/>
           </a:p>
@@ -4378,7 +4573,7 @@
           <a:p>
             <a:r>
               <a:rPr lang="en-US" dirty="0"/>
-              <a:t>Before manipulating a Word document, it is important to understand it’s hierarchy and how that relates to the objects you will work with in </a:t>
+              <a:t>Word add-in developers should understand a Word document's hierarchy and how that relates to the objects in </a:t>
             </a:r>
             <a:r>
               <a:rPr lang="en-US" dirty="0" err="1"/>
@@ -4390,17 +4585,16 @@
             </a:r>
           </a:p>
           <a:p>
-            <a:r>
-              <a:rPr lang="en-US" dirty="0"/>
-              <a:t>As seen in the previous slide, </a:t>
-            </a:r>
+            <a:endParaRPr lang="en-US" dirty="0"/>
+          </a:p>
+          <a:p>
             <a:r>
               <a:rPr lang="en-US" dirty="0" err="1"/>
               <a:t>Office.js</a:t>
             </a:r>
             <a:r>
               <a:rPr lang="en-US" dirty="0"/>
-              <a:t> provides context to an add-in via </a:t>
+              <a:t> provides context to a Word document through </a:t>
             </a:r>
             <a:r>
               <a:rPr lang="en-US" dirty="0" err="1"/>
@@ -4408,22 +4602,66 @@
             </a:r>
             <a:r>
               <a:rPr lang="en-US" dirty="0"/>
-              <a:t>…that context contains a </a:t>
-            </a:r>
-            <a:r>
-              <a:rPr lang="en-US" dirty="0" err="1"/>
-              <a:t>docment</a:t>
-            </a:r>
-            <a:r>
-              <a:rPr lang="en-US" dirty="0"/>
-              <a:t> property.</a:t>
-            </a:r>
-          </a:p>
-          <a:p>
-            <a:r>
-              <a:rPr lang="en-US" dirty="0"/>
-              <a:t>A document has a body, which contains a number of paragraphs.</a:t>
-            </a:r>
+              <a:t> and the `</a:t>
+            </a:r>
+            <a:r>
+              <a:rPr lang="en-US" dirty="0" err="1"/>
+              <a:t>context.document</a:t>
+            </a:r>
+            <a:r>
+              <a:rPr lang="en-US" dirty="0"/>
+              <a:t>` property.</a:t>
+            </a:r>
+          </a:p>
+          <a:p>
+            <a:r>
+              <a:rPr lang="en-US" dirty="0"/>
+              <a:t>The document contains a body, which contains a number of collections, including paragraphs, tables, and more.</a:t>
+            </a:r>
+          </a:p>
+          <a:p>
+            <a:endParaRPr lang="en-US" dirty="0"/>
+          </a:p>
+          <a:p>
+            <a:r>
+              <a:rPr lang="en-US" dirty="0"/>
+              <a:t>The relationships in this hierarchy are exposed as properties in the API allowing traversal up (ex: `</a:t>
+            </a:r>
+            <a:r>
+              <a:rPr lang="en-US" dirty="0" err="1"/>
+              <a:t>paragraph.parentBody</a:t>
+            </a:r>
+            <a:r>
+              <a:rPr lang="en-US" dirty="0"/>
+              <a:t>`), down (ex: `</a:t>
+            </a:r>
+            <a:r>
+              <a:rPr lang="en-US" dirty="0" err="1"/>
+              <a:t>body.paragraphs</a:t>
+            </a:r>
+            <a:r>
+              <a:rPr lang="en-US" dirty="0"/>
+              <a:t>`), and horizontal (ex: `</a:t>
+            </a:r>
+            <a:r>
+              <a:rPr lang="en-US" dirty="0" err="1"/>
+              <a:t>paragraph.getNext</a:t>
+            </a:r>
+            <a:r>
+              <a:rPr lang="en-US" dirty="0"/>
+              <a:t>()` or `</a:t>
+            </a:r>
+            <a:r>
+              <a:rPr lang="en-US" dirty="0" err="1"/>
+              <a:t>paragraph.getPrevious</a:t>
+            </a:r>
+            <a:r>
+              <a:rPr lang="en-US" dirty="0"/>
+              <a:t>()`).</a:t>
+            </a:r>
+          </a:p>
+          <a:p>
+            <a:endParaRPr lang="en-US" dirty="0"/>
           </a:p>
           <a:p>
             <a:r>
@@ -4432,13 +4670,16 @@
             </a:r>
             <a:r>
               <a:rPr lang="en-US" dirty="0"/>
-              <a:t> allows you to easily traverse and manipulate this hierarchy.</a:t>
-            </a:r>
-          </a:p>
-          <a:p>
-            <a:r>
-              <a:rPr lang="en-US" dirty="0"/>
-              <a:t>Paragraphs are aware of their siblings, with abilities to </a:t>
+              <a:t> allows you to insert new paragraphs and edit, delete, and clear existing paragraphs as well as how they appear in a document.</a:t>
+            </a:r>
+          </a:p>
+          <a:p>
+            <a:endParaRPr lang="en-US" dirty="0"/>
+          </a:p>
+          <a:p>
+            <a:r>
+              <a:rPr lang="en-US" dirty="0"/>
+              <a:t>Paragraphs are aware of their siblings using `</a:t>
             </a:r>
             <a:r>
               <a:rPr lang="en-US" dirty="0" err="1"/>
@@ -4446,18 +4687,15 @@
             </a:r>
             <a:r>
               <a:rPr lang="en-US" dirty="0"/>
-              <a:t> and </a:t>
+              <a:t>` and `</a:t>
             </a:r>
             <a:r>
               <a:rPr lang="en-US" dirty="0" err="1"/>
               <a:t>getPrevious</a:t>
             </a:r>
-            <a:endParaRPr lang="en-US" dirty="0"/>
-          </a:p>
-          <a:p>
-            <a:r>
-              <a:rPr lang="en-US" dirty="0"/>
-              <a:t>You can also insert paragraphs relative to one another </a:t>
+            <a:r>
+              <a:rPr lang="en-US" dirty="0"/>
+              <a:t>` operations as well as when inserting a paragraph relative to self using `before` of `after` location.</a:t>
             </a:r>
           </a:p>
         </p:txBody>
@@ -4657,7 +4895,7 @@
                 <a:tabLst/>
                 <a:defRPr/>
               </a:pPr>
-              <a:t>3/3/20 8:30 PM</a:t>
+              <a:t>3/30/20 3:59 PM</a:t>
             </a:fld>
             <a:endParaRPr kumimoji="0" lang="en-US" sz="1200" b="0" i="0" u="none" strike="noStrike" kern="1200" cap="none" spc="0" normalizeH="0" baseline="0" noProof="0" dirty="0">
               <a:ln>
@@ -4953,7 +5191,7 @@
           <a:p>
             <a:fld id="{D18B56EA-E28F-4F92-9F16-7A6F2501B303}" type="datetime8">
               <a:rPr lang="en-US" smtClean="0"/>
-              <a:t>3/3/20 8:30 PM</a:t>
+              <a:t>3/30/20 3:59 PM</a:t>
             </a:fld>
             <a:endParaRPr lang="en-US" dirty="0"/>
           </a:p>
@@ -5161,7 +5399,7 @@
           <a:p>
             <a:fld id="{D18B56EA-E28F-4F92-9F16-7A6F2501B303}" type="datetime8">
               <a:rPr lang="en-US" smtClean="0"/>
-              <a:t>3/3/20 8:30 PM</a:t>
+              <a:t>3/30/20 3:59 PM</a:t>
             </a:fld>
             <a:endParaRPr lang="en-US" dirty="0"/>
           </a:p>
@@ -5250,7 +5488,7 @@
           <a:p>
             <a:r>
               <a:rPr lang="en-US" dirty="0"/>
-              <a:t>Styles and Formatting are what make an attractive document and </a:t>
+              <a:t>Styles and formatting are what make an attractive document. </a:t>
             </a:r>
             <a:r>
               <a:rPr lang="en-US" dirty="0" err="1"/>
@@ -5258,14 +5496,29 @@
             </a:r>
             <a:r>
               <a:rPr lang="en-US" dirty="0"/>
-              <a:t> allows you to easily work with styles and formatting.</a:t>
-            </a:r>
-          </a:p>
-          <a:p>
-            <a:r>
-              <a:rPr lang="en-US" dirty="0"/>
-              <a:t>Styles are similar to a CSS class in HTML as they provide pre-configured and reusable formatting for paragraphs and text ranges</a:t>
-            </a:r>
+              <a:t> allows you to easily work with styles and formatting from your custom Word add-in.</a:t>
+            </a:r>
+          </a:p>
+          <a:p>
+            <a:endParaRPr lang="en-US" dirty="0"/>
+          </a:p>
+          <a:p>
+            <a:r>
+              <a:rPr lang="en-US" dirty="0"/>
+              <a:t>### Styles</a:t>
+            </a:r>
+          </a:p>
+          <a:p>
+            <a:endParaRPr lang="en-US" dirty="0"/>
+          </a:p>
+          <a:p>
+            <a:r>
+              <a:rPr lang="en-US" dirty="0"/>
+              <a:t>Styles in Microsoft Word are similar to a CSS class in HTML. They provide a pre-configured and reusable set of formatting to be applied to a paragraph or range of text.</a:t>
+            </a:r>
+          </a:p>
+          <a:p>
+            <a:endParaRPr lang="en-US" dirty="0"/>
           </a:p>
           <a:p>
             <a:r>
@@ -5274,29 +5527,60 @@
             </a:r>
             <a:r>
               <a:rPr lang="en-US" dirty="0"/>
-              <a:t> can apply both out of the box and custom styles</a:t>
-            </a:r>
-          </a:p>
-          <a:p>
-            <a:r>
-              <a:rPr lang="en-US" dirty="0"/>
-              <a:t>Fonts are similar to inline styles in HTML…explicitly setting a font only applies to that paragraph or range.</a:t>
-            </a:r>
-          </a:p>
-          <a:p>
-            <a:r>
-              <a:rPr lang="en-US" dirty="0"/>
-              <a:t>You can manipulate the font family, weight, size, colors, and more</a:t>
-            </a:r>
-          </a:p>
-          <a:p>
+              <a:t> can apply both out of the box styles and custom styles to paragraphs and ranges of text.</a:t>
+            </a:r>
+          </a:p>
+          <a:p>
+            <a:endParaRPr lang="en-US" dirty="0"/>
+          </a:p>
+          <a:p>
+            <a:r>
+              <a:rPr lang="en-US" dirty="0"/>
+              <a:t>### Fonts</a:t>
+            </a:r>
+          </a:p>
+          <a:p>
+            <a:endParaRPr lang="en-US" dirty="0"/>
+          </a:p>
+          <a:p>
+            <a:r>
+              <a:rPr lang="en-US" dirty="0"/>
+              <a:t>Modifying a font is similar to applying an inline style in HTML. Setting a font allows you to manipulate the font family, weight, size, colors, and more.</a:t>
+            </a:r>
+          </a:p>
+          <a:p>
+            <a:endParaRPr lang="en-US" dirty="0"/>
+          </a:p>
+          <a:p>
+            <a:r>
+              <a:rPr lang="en-US" dirty="0"/>
+              <a:t>Like styles, fonts can be applied to an entire paragraph or range of text.</a:t>
+            </a:r>
+          </a:p>
+          <a:p>
+            <a:endParaRPr lang="en-US" dirty="0"/>
+          </a:p>
+          <a:p>
+            <a:r>
+              <a:rPr lang="en-US" dirty="0"/>
+              <a:t>### Paragraph formatting</a:t>
+            </a:r>
+          </a:p>
+          <a:p>
+            <a:endParaRPr lang="en-US" dirty="0"/>
+          </a:p>
+          <a:p>
+            <a:r>
+              <a:rPr lang="en-US" dirty="0"/>
+              <a:t>In addition to styles and fonts, paragraphs offer additional formatting through </a:t>
+            </a:r>
             <a:r>
               <a:rPr lang="en-US" dirty="0" err="1"/>
               <a:t>Office.js</a:t>
             </a:r>
             <a:r>
               <a:rPr lang="en-US" dirty="0"/>
-              <a:t> also allows you to apply formatting to paragraphs such as alignment, indention, and line spacing.</a:t>
+              <a:t> such as alignment, indention, and line spacing.</a:t>
             </a:r>
           </a:p>
         </p:txBody>
@@ -5496,7 +5780,7 @@
                 <a:tabLst/>
                 <a:defRPr/>
               </a:pPr>
-              <a:t>3/3/20 8:30 PM</a:t>
+              <a:t>3/30/20 3:59 PM</a:t>
             </a:fld>
             <a:endParaRPr kumimoji="0" lang="en-US" sz="1200" b="0" i="0" u="none" strike="noStrike" kern="1200" cap="none" spc="0" normalizeH="0" baseline="0" noProof="0" dirty="0">
               <a:ln>
@@ -5794,7 +6078,7 @@
           <a:p>
             <a:fld id="{D18B56EA-E28F-4F92-9F16-7A6F2501B303}" type="datetime8">
               <a:rPr lang="en-US" smtClean="0"/>
-              <a:t>3/3/20 8:30 PM</a:t>
+              <a:t>3/30/20 3:59 PM</a:t>
             </a:fld>
             <a:endParaRPr lang="en-US" dirty="0"/>
           </a:p>

</xml_diff>

<commit_message>
FY21Q4 refresh - office-add-ins-word
- run through all exercise steps in associated MSLearn module to validate good working order
- updated steps & fixed typos where necessary
- updated slides where necessary
- update references to add-ins & OUIF to casing & references per PG feedback
- update code samples to reflect MSLearn HOL exercise refresh & updates
- any & all users/names/company names/pictures/IDs are not real people/tenants... all are from M365 demo tenants provided by Microsoft
</commit_message>
<xml_diff>
--- a/OfficeAddin/01 Building Add-ins for Microsoft Word/01 Text and Formatting in Word Add-ins.pptx
+++ b/OfficeAddin/01 Building Add-ins for Microsoft Word/01 Text and Formatting in Word Add-ins.pptx
@@ -271,7 +271,7 @@
               <a:rPr lang="en-US" smtClean="0">
                 <a:latin typeface="Segoe UI" pitchFamily="34" charset="0"/>
               </a:rPr>
-              <a:t>3/30/20 3:59 PM</a:t>
+              <a:t>6/17/21 3:03 PM</a:t>
             </a:fld>
             <a:endParaRPr lang="en-US" dirty="0">
               <a:latin typeface="Segoe UI" pitchFamily="34" charset="0"/>
@@ -565,7 +565,7 @@
           <a:p>
             <a:fld id="{D18B56EA-E28F-4F92-9F16-7A6F2501B303}" type="datetime8">
               <a:rPr lang="en-US" smtClean="0"/>
-              <a:t>3/30/20 3:59 PM</a:t>
+              <a:t>6/17/21 3:03 PM</a:t>
             </a:fld>
             <a:endParaRPr lang="en-US" dirty="0"/>
           </a:p>
@@ -1068,7 +1068,7 @@
                 <a:tabLst/>
                 <a:defRPr/>
               </a:pPr>
-              <a:t>3/30/20 3:59 PM</a:t>
+              <a:t>6/17/21 3:03 PM</a:t>
             </a:fld>
             <a:endParaRPr kumimoji="0" lang="en-US" sz="1200" b="0" i="0" u="none" strike="noStrike" kern="1200" cap="none" spc="0" normalizeH="0" baseline="0" noProof="0" dirty="0">
               <a:ln>
@@ -1572,7 +1572,7 @@
                 <a:tabLst/>
                 <a:defRPr/>
               </a:pPr>
-              <a:t>3/30/20 4:05 PM</a:t>
+              <a:t>6/17/21 3:03 PM</a:t>
             </a:fld>
             <a:endParaRPr kumimoji="0" lang="en-US" sz="1200" b="0" i="0" u="none" strike="noStrike" kern="1200" cap="none" spc="0" normalizeH="0" baseline="0" noProof="0" dirty="0">
               <a:ln>
@@ -1878,7 +1878,7 @@
           <a:p>
             <a:fld id="{D18B56EA-E28F-4F92-9F16-7A6F2501B303}" type="datetime8">
               <a:rPr lang="en-US" smtClean="0"/>
-              <a:t>3/30/20 3:59 PM</a:t>
+              <a:t>6/17/21 3:03 PM</a:t>
             </a:fld>
             <a:endParaRPr lang="en-US" dirty="0"/>
           </a:p>
@@ -3069,7 +3069,7 @@
           <a:p>
             <a:fld id="{D18B56EA-E28F-4F92-9F16-7A6F2501B303}" type="datetime8">
               <a:rPr lang="en-US" smtClean="0"/>
-              <a:t>3/30/20 3:59 PM</a:t>
+              <a:t>6/17/21 3:03 PM</a:t>
             </a:fld>
             <a:endParaRPr lang="en-US" dirty="0"/>
           </a:p>
@@ -3250,7 +3250,7 @@
           <a:p>
             <a:fld id="{D18B56EA-E28F-4F92-9F16-7A6F2501B303}" type="datetime8">
               <a:rPr lang="en-US" smtClean="0"/>
-              <a:t>3/30/20 3:59 PM</a:t>
+              <a:t>6/17/21 3:03 PM</a:t>
             </a:fld>
             <a:endParaRPr lang="en-US" dirty="0"/>
           </a:p>
@@ -3431,7 +3431,7 @@
           <a:p>
             <a:fld id="{D18B56EA-E28F-4F92-9F16-7A6F2501B303}" type="datetime8">
               <a:rPr lang="en-US" smtClean="0"/>
-              <a:t>3/30/20 3:59 PM</a:t>
+              <a:t>6/17/21 3:03 PM</a:t>
             </a:fld>
             <a:endParaRPr lang="en-US" dirty="0"/>
           </a:p>
@@ -3612,7 +3612,7 @@
           <a:p>
             <a:fld id="{D18B56EA-E28F-4F92-9F16-7A6F2501B303}" type="datetime8">
               <a:rPr lang="en-US" smtClean="0"/>
-              <a:t>3/30/20 3:59 PM</a:t>
+              <a:t>6/17/21 3:03 PM</a:t>
             </a:fld>
             <a:endParaRPr lang="en-US" dirty="0"/>
           </a:p>
@@ -3904,7 +3904,7 @@
                 <a:tabLst/>
                 <a:defRPr/>
               </a:pPr>
-              <a:t>3/30/20 3:59 PM</a:t>
+              <a:t>6/17/21 3:03 PM</a:t>
             </a:fld>
             <a:endParaRPr kumimoji="0" lang="en-US" sz="1200" b="0" i="0" u="none" strike="noStrike" kern="1200" cap="none" spc="0" normalizeH="0" baseline="0" noProof="0" dirty="0">
               <a:ln>
@@ -4484,7 +4484,7 @@
           <a:p>
             <a:fld id="{D18B56EA-E28F-4F92-9F16-7A6F2501B303}" type="datetime8">
               <a:rPr lang="en-US" smtClean="0"/>
-              <a:t>3/30/20 3:59 PM</a:t>
+              <a:t>6/17/21 3:03 PM</a:t>
             </a:fld>
             <a:endParaRPr lang="en-US" dirty="0"/>
           </a:p>
@@ -4895,7 +4895,7 @@
                 <a:tabLst/>
                 <a:defRPr/>
               </a:pPr>
-              <a:t>3/30/20 3:59 PM</a:t>
+              <a:t>6/17/21 3:03 PM</a:t>
             </a:fld>
             <a:endParaRPr kumimoji="0" lang="en-US" sz="1200" b="0" i="0" u="none" strike="noStrike" kern="1200" cap="none" spc="0" normalizeH="0" baseline="0" noProof="0" dirty="0">
               <a:ln>
@@ -5191,7 +5191,7 @@
           <a:p>
             <a:fld id="{D18B56EA-E28F-4F92-9F16-7A6F2501B303}" type="datetime8">
               <a:rPr lang="en-US" smtClean="0"/>
-              <a:t>3/30/20 3:59 PM</a:t>
+              <a:t>6/17/21 3:03 PM</a:t>
             </a:fld>
             <a:endParaRPr lang="en-US" dirty="0"/>
           </a:p>
@@ -5399,7 +5399,7 @@
           <a:p>
             <a:fld id="{D18B56EA-E28F-4F92-9F16-7A6F2501B303}" type="datetime8">
               <a:rPr lang="en-US" smtClean="0"/>
-              <a:t>3/30/20 3:59 PM</a:t>
+              <a:t>6/17/21 3:03 PM</a:t>
             </a:fld>
             <a:endParaRPr lang="en-US" dirty="0"/>
           </a:p>
@@ -5780,7 +5780,7 @@
                 <a:tabLst/>
                 <a:defRPr/>
               </a:pPr>
-              <a:t>3/30/20 3:59 PM</a:t>
+              <a:t>6/17/21 3:03 PM</a:t>
             </a:fld>
             <a:endParaRPr kumimoji="0" lang="en-US" sz="1200" b="0" i="0" u="none" strike="noStrike" kern="1200" cap="none" spc="0" normalizeH="0" baseline="0" noProof="0" dirty="0">
               <a:ln>
@@ -6078,7 +6078,7 @@
           <a:p>
             <a:fld id="{D18B56EA-E28F-4F92-9F16-7A6F2501B303}" type="datetime8">
               <a:rPr lang="en-US" smtClean="0"/>
-              <a:t>3/30/20 3:59 PM</a:t>
+              <a:t>6/17/21 3:03 PM</a:t>
             </a:fld>
             <a:endParaRPr lang="en-US" dirty="0"/>
           </a:p>
@@ -16632,7 +16632,7 @@
         <p:spPr>
           <a:xfrm>
             <a:off x="465139" y="1500487"/>
-            <a:ext cx="5905181" cy="2566857"/>
+            <a:ext cx="5905181" cy="2788456"/>
           </a:xfrm>
           <a:prstGeom prst="rect">
             <a:avLst/>
@@ -16913,25 +16913,55 @@
                 </a:solidFill>
                 <a:latin typeface="+mj-lt"/>
               </a:rPr>
-              <a:t>Ranges can be established through a number of ways, including search, selection, or conversion (ex: </a:t>
+              <a:t>Ranges can be established through a number of ways, including search, selection, or conversion </a:t>
+            </a:r>
+            <a:r>
+              <a:rPr lang="en-US" sz="1600" dirty="0">
+                <a:solidFill>
+                  <a:srgbClr val="2F2F2F"/>
+                </a:solidFill>
+                <a:latin typeface="Courier New" panose="02070309020205020404" pitchFamily="49" charset="0"/>
+                <a:cs typeface="Courier New" panose="02070309020205020404" pitchFamily="49" charset="0"/>
+              </a:rPr>
+              <a:t>(</a:t>
+            </a:r>
+            <a:r>
+              <a:rPr lang="en-US" sz="1600" dirty="0">
+                <a:solidFill>
+                  <a:srgbClr val="2F2F2F"/>
+                </a:solidFill>
+                <a:latin typeface="+mj-lt"/>
+              </a:rPr>
+              <a:t>ex: </a:t>
             </a:r>
             <a:r>
               <a:rPr lang="en-US" sz="1600" dirty="0" err="1">
                 <a:solidFill>
                   <a:srgbClr val="2F2F2F"/>
                 </a:solidFill>
+                <a:latin typeface="Courier New" panose="02070309020205020404" pitchFamily="49" charset="0"/>
+                <a:cs typeface="Courier New" panose="02070309020205020404" pitchFamily="49" charset="0"/>
+              </a:rPr>
+              <a:t>paragraph.getRange</a:t>
+            </a:r>
+            <a:r>
+              <a:rPr lang="en-US" sz="1600" dirty="0">
+                <a:solidFill>
+                  <a:srgbClr val="2F2F2F"/>
+                </a:solidFill>
+                <a:latin typeface="Courier New" panose="02070309020205020404" pitchFamily="49" charset="0"/>
+                <a:cs typeface="Courier New" panose="02070309020205020404" pitchFamily="49" charset="0"/>
+              </a:rPr>
+              <a:t>())</a:t>
+            </a:r>
+            <a:r>
+              <a:rPr lang="en-US" sz="1600" dirty="0">
+                <a:solidFill>
+                  <a:srgbClr val="2F2F2F"/>
+                </a:solidFill>
                 <a:latin typeface="+mj-lt"/>
               </a:rPr>
-              <a:t>paragraph.getRange</a:t>
-            </a:r>
-            <a:r>
-              <a:rPr lang="en-US" sz="1600" dirty="0">
-                <a:solidFill>
-                  <a:srgbClr val="2F2F2F"/>
-                </a:solidFill>
-                <a:latin typeface="+mj-lt"/>
-              </a:rPr>
-              <a:t>()). </a:t>
+              <a:t>. </a:t>
             </a:r>
             <a:endParaRPr lang="en-US" sz="1600" dirty="0">
               <a:solidFill>
@@ -19766,7 +19796,7 @@
                   <a:srgbClr val="D83B01"/>
                 </a:solidFill>
               </a:rPr>
-              <a:t>Anatomy of Word Add-in</a:t>
+              <a:t>Anatomy of Word add-in</a:t>
             </a:r>
           </a:p>
           <a:p>
@@ -19781,7 +19811,7 @@
                   <a:srgbClr val="D83B01"/>
                 </a:solidFill>
               </a:rPr>
-              <a:t>Text and Paragraphs</a:t>
+              <a:t>Text and paragraphs</a:t>
             </a:r>
           </a:p>
           <a:p>
@@ -19796,7 +19826,7 @@
                   <a:srgbClr val="D83B01"/>
                 </a:solidFill>
               </a:rPr>
-              <a:t>Styles and Formatting</a:t>
+              <a:t>Styles and formatting</a:t>
             </a:r>
           </a:p>
           <a:p>
@@ -19811,7 +19841,7 @@
                   <a:srgbClr val="D83B01"/>
                 </a:solidFill>
               </a:rPr>
-              <a:t>Selections and Ranges</a:t>
+              <a:t>Selections and ranges</a:t>
             </a:r>
           </a:p>
           <a:p>
@@ -25438,7 +25468,7 @@
         <p159:morph option="byObject"/>
       </p:transition>
     </mc:Choice>
-    <mc:Fallback xmlns:p14="http://schemas.microsoft.com/office/powerpoint/2010/main" xmlns:a14="http://schemas.microsoft.com/office/drawing/2010/main" xmlns="">
+    <mc:Fallback xmlns="" xmlns:a14="http://schemas.microsoft.com/office/drawing/2010/main" xmlns:p14="http://schemas.microsoft.com/office/powerpoint/2010/main">
       <p:transition spd="slow">
         <p:fade/>
       </p:transition>
@@ -29418,7 +29448,7 @@
         <p:spPr>
           <a:xfrm>
             <a:off x="465139" y="1500487"/>
-            <a:ext cx="7109142" cy="3751796"/>
+            <a:ext cx="7109142" cy="4194995"/>
           </a:xfrm>
           <a:prstGeom prst="rect">
             <a:avLst/>
@@ -29696,25 +29726,27 @@
                 <a:solidFill>
                   <a:srgbClr val="2F2F2F"/>
                 </a:solidFill>
+                <a:latin typeface="Courier New" panose="02070309020205020404" pitchFamily="49" charset="0"/>
+                <a:cs typeface="Courier New" panose="02070309020205020404" pitchFamily="49" charset="0"/>
+              </a:rPr>
+              <a:t>Word.run</a:t>
+            </a:r>
+            <a:r>
+              <a:rPr lang="en-US" sz="1600" dirty="0">
+                <a:solidFill>
+                  <a:srgbClr val="2F2F2F"/>
+                </a:solidFill>
                 <a:latin typeface="+mj-lt"/>
               </a:rPr>
-              <a:t>Word.run</a:t>
-            </a:r>
-            <a:r>
-              <a:rPr lang="en-US" sz="1600" dirty="0">
+              <a:t> and the </a:t>
+            </a:r>
+            <a:r>
+              <a:rPr lang="en-US" sz="1600" dirty="0" err="1">
                 <a:solidFill>
                   <a:srgbClr val="2F2F2F"/>
                 </a:solidFill>
-                <a:latin typeface="+mj-lt"/>
-              </a:rPr>
-              <a:t> and the </a:t>
-            </a:r>
-            <a:r>
-              <a:rPr lang="en-US" sz="1600" dirty="0" err="1">
-                <a:solidFill>
-                  <a:srgbClr val="2F2F2F"/>
-                </a:solidFill>
-                <a:latin typeface="+mj-lt"/>
+                <a:latin typeface="Courier New" panose="02070309020205020404" pitchFamily="49" charset="0"/>
+                <a:cs typeface="Courier New" panose="02070309020205020404" pitchFamily="49" charset="0"/>
               </a:rPr>
               <a:t>context.document</a:t>
             </a:r>
@@ -29763,79 +29795,180 @@
                 </a:solidFill>
                 <a:latin typeface="+mj-lt"/>
               </a:rPr>
-              <a:t>The relationships in this hierarchy are exposed as properties in the API allowing traversal up (ex: </a:t>
+              <a:t>The relationships in this hierarchy are exposed as properties in the API allowing traversal up </a:t>
+            </a:r>
+            <a:r>
+              <a:rPr lang="en-US" sz="1600" dirty="0">
+                <a:solidFill>
+                  <a:srgbClr val="2F2F2F"/>
+                </a:solidFill>
+                <a:latin typeface="Courier New" panose="02070309020205020404" pitchFamily="49" charset="0"/>
+                <a:cs typeface="Courier New" panose="02070309020205020404" pitchFamily="49" charset="0"/>
+              </a:rPr>
+              <a:t>(</a:t>
+            </a:r>
+            <a:r>
+              <a:rPr lang="en-US" sz="1600" dirty="0">
+                <a:solidFill>
+                  <a:srgbClr val="2F2F2F"/>
+                </a:solidFill>
+                <a:latin typeface="+mj-lt"/>
+              </a:rPr>
+              <a:t>ex: </a:t>
             </a:r>
             <a:r>
               <a:rPr lang="en-US" sz="1600" dirty="0" err="1">
                 <a:solidFill>
                   <a:srgbClr val="2F2F2F"/>
                 </a:solidFill>
+                <a:latin typeface="Courier New" panose="02070309020205020404" pitchFamily="49" charset="0"/>
+                <a:cs typeface="Courier New" panose="02070309020205020404" pitchFamily="49" charset="0"/>
+              </a:rPr>
+              <a:t>paragraph.parentBody</a:t>
+            </a:r>
+            <a:r>
+              <a:rPr lang="en-US" sz="1600" dirty="0">
+                <a:solidFill>
+                  <a:srgbClr val="2F2F2F"/>
+                </a:solidFill>
+                <a:latin typeface="Courier New" panose="02070309020205020404" pitchFamily="49" charset="0"/>
+                <a:cs typeface="Courier New" panose="02070309020205020404" pitchFamily="49" charset="0"/>
+              </a:rPr>
+              <a:t>)</a:t>
+            </a:r>
+            <a:r>
+              <a:rPr lang="en-US" sz="1600" dirty="0">
+                <a:solidFill>
+                  <a:srgbClr val="2F2F2F"/>
+                </a:solidFill>
                 <a:latin typeface="+mj-lt"/>
               </a:rPr>
-              <a:t>paragraph.parentBody</a:t>
+              <a:t>, down </a:t>
             </a:r>
             <a:r>
               <a:rPr lang="en-US" sz="1600" dirty="0">
                 <a:solidFill>
                   <a:srgbClr val="2F2F2F"/>
                 </a:solidFill>
+                <a:latin typeface="Courier New" panose="02070309020205020404" pitchFamily="49" charset="0"/>
+                <a:cs typeface="Courier New" panose="02070309020205020404" pitchFamily="49" charset="0"/>
+              </a:rPr>
+              <a:t>(</a:t>
+            </a:r>
+            <a:r>
+              <a:rPr lang="en-US" sz="1600" dirty="0">
+                <a:solidFill>
+                  <a:srgbClr val="2F2F2F"/>
+                </a:solidFill>
                 <a:latin typeface="+mj-lt"/>
               </a:rPr>
-              <a:t>), down (ex: </a:t>
+              <a:t>ex: </a:t>
             </a:r>
             <a:r>
               <a:rPr lang="en-US" sz="1600" dirty="0" err="1">
                 <a:solidFill>
                   <a:srgbClr val="2F2F2F"/>
                 </a:solidFill>
+                <a:latin typeface="Courier New" panose="02070309020205020404" pitchFamily="49" charset="0"/>
+                <a:cs typeface="Courier New" panose="02070309020205020404" pitchFamily="49" charset="0"/>
+              </a:rPr>
+              <a:t>body.paragraphs</a:t>
+            </a:r>
+            <a:r>
+              <a:rPr lang="en-US" sz="1600" dirty="0">
+                <a:solidFill>
+                  <a:srgbClr val="2F2F2F"/>
+                </a:solidFill>
+                <a:latin typeface="Courier New" panose="02070309020205020404" pitchFamily="49" charset="0"/>
+                <a:cs typeface="Courier New" panose="02070309020205020404" pitchFamily="49" charset="0"/>
+              </a:rPr>
+              <a:t>)</a:t>
+            </a:r>
+            <a:r>
+              <a:rPr lang="en-US" sz="1600" dirty="0">
+                <a:solidFill>
+                  <a:srgbClr val="2F2F2F"/>
+                </a:solidFill>
                 <a:latin typeface="+mj-lt"/>
               </a:rPr>
-              <a:t>body.paragraphs</a:t>
+              <a:t>, and horizontal </a:t>
             </a:r>
             <a:r>
               <a:rPr lang="en-US" sz="1600" dirty="0">
                 <a:solidFill>
                   <a:srgbClr val="2F2F2F"/>
                 </a:solidFill>
+                <a:latin typeface="Courier New" panose="02070309020205020404" pitchFamily="49" charset="0"/>
+                <a:cs typeface="Courier New" panose="02070309020205020404" pitchFamily="49" charset="0"/>
+              </a:rPr>
+              <a:t>(</a:t>
+            </a:r>
+            <a:r>
+              <a:rPr lang="en-US" sz="1600" dirty="0">
+                <a:solidFill>
+                  <a:srgbClr val="2F2F2F"/>
+                </a:solidFill>
                 <a:latin typeface="+mj-lt"/>
               </a:rPr>
-              <a:t>), and horizontal (ex: </a:t>
+              <a:t>ex: </a:t>
             </a:r>
             <a:r>
               <a:rPr lang="en-US" sz="1600" dirty="0" err="1">
                 <a:solidFill>
                   <a:srgbClr val="2F2F2F"/>
                 </a:solidFill>
+                <a:latin typeface="Courier New" panose="02070309020205020404" pitchFamily="49" charset="0"/>
+                <a:cs typeface="Courier New" panose="02070309020205020404" pitchFamily="49" charset="0"/>
+              </a:rPr>
+              <a:t>paragraph.getNext</a:t>
+            </a:r>
+            <a:r>
+              <a:rPr lang="en-US" sz="1600" dirty="0">
+                <a:solidFill>
+                  <a:srgbClr val="2F2F2F"/>
+                </a:solidFill>
+                <a:latin typeface="Courier New" panose="02070309020205020404" pitchFamily="49" charset="0"/>
+                <a:cs typeface="Courier New" panose="02070309020205020404" pitchFamily="49" charset="0"/>
+              </a:rPr>
+              <a:t>()</a:t>
+            </a:r>
+            <a:r>
+              <a:rPr lang="en-US" sz="1600" dirty="0">
+                <a:solidFill>
+                  <a:srgbClr val="2F2F2F"/>
+                </a:solidFill>
                 <a:latin typeface="+mj-lt"/>
               </a:rPr>
-              <a:t>paragraph.getNext</a:t>
+              <a:t> or </a:t>
+            </a:r>
+            <a:r>
+              <a:rPr lang="en-US" sz="1600" dirty="0" err="1">
+                <a:solidFill>
+                  <a:srgbClr val="2F2F2F"/>
+                </a:solidFill>
+                <a:latin typeface="Courier New" panose="02070309020205020404" pitchFamily="49" charset="0"/>
+                <a:cs typeface="Courier New" panose="02070309020205020404" pitchFamily="49" charset="0"/>
+              </a:rPr>
+              <a:t>paragraph.getPrevious</a:t>
             </a:r>
             <a:r>
               <a:rPr lang="en-US" sz="1600" dirty="0">
                 <a:solidFill>
                   <a:srgbClr val="2F2F2F"/>
                 </a:solidFill>
+                <a:latin typeface="Courier New" panose="02070309020205020404" pitchFamily="49" charset="0"/>
+                <a:cs typeface="Courier New" panose="02070309020205020404" pitchFamily="49" charset="0"/>
+              </a:rPr>
+              <a:t>())</a:t>
+            </a:r>
+            <a:r>
+              <a:rPr lang="en-US" sz="1600" dirty="0">
+                <a:solidFill>
+                  <a:srgbClr val="2F2F2F"/>
+                </a:solidFill>
                 <a:latin typeface="+mj-lt"/>
               </a:rPr>
-              <a:t>() or </a:t>
-            </a:r>
-            <a:r>
-              <a:rPr lang="en-US" sz="1600" dirty="0" err="1">
-                <a:solidFill>
-                  <a:srgbClr val="2F2F2F"/>
-                </a:solidFill>
-                <a:latin typeface="+mj-lt"/>
-              </a:rPr>
-              <a:t>paragraph.getPrevious</a:t>
-            </a:r>
-            <a:r>
-              <a:rPr lang="en-US" sz="1600" dirty="0">
-                <a:solidFill>
-                  <a:srgbClr val="2F2F2F"/>
-                </a:solidFill>
-                <a:latin typeface="+mj-lt"/>
-              </a:rPr>
-              <a:t>()).</a:t>
+              <a:t>.</a:t>
             </a:r>
             <a:endParaRPr lang="en-US" sz="1600" dirty="0">
               <a:solidFill>
@@ -29929,36 +30062,67 @@
                 <a:solidFill>
                   <a:srgbClr val="2F2F2F"/>
                 </a:solidFill>
+                <a:latin typeface="Courier New" panose="02070309020205020404" pitchFamily="49" charset="0"/>
+                <a:cs typeface="Courier New" panose="02070309020205020404" pitchFamily="49" charset="0"/>
+              </a:rPr>
+              <a:t>getNext</a:t>
+            </a:r>
+            <a:r>
+              <a:rPr lang="en-US" sz="1600" dirty="0">
+                <a:solidFill>
+                  <a:srgbClr val="2F2F2F"/>
+                </a:solidFill>
                 <a:latin typeface="Segoe UI Semibold"/>
               </a:rPr>
-              <a:t>getNext</a:t>
+              <a:t> and operations as well as when inserting a paragraph relative to self </a:t>
+            </a:r>
+            <a:r>
+              <a:rPr lang="en-US" sz="1600" dirty="0" err="1">
+                <a:solidFill>
+                  <a:srgbClr val="2F2F2F"/>
+                </a:solidFill>
+                <a:latin typeface="Courier New" panose="02070309020205020404" pitchFamily="49" charset="0"/>
+                <a:cs typeface="Courier New" panose="02070309020205020404" pitchFamily="49" charset="0"/>
+              </a:rPr>
+              <a:t>getPrevious</a:t>
             </a:r>
             <a:r>
               <a:rPr lang="en-US" sz="1600" dirty="0">
                 <a:solidFill>
                   <a:srgbClr val="2F2F2F"/>
                 </a:solidFill>
+                <a:latin typeface="Courier New" panose="02070309020205020404" pitchFamily="49" charset="0"/>
+                <a:cs typeface="Courier New" panose="02070309020205020404" pitchFamily="49" charset="0"/>
+              </a:rPr>
+              <a:t>()(</a:t>
+            </a:r>
+            <a:r>
+              <a:rPr lang="en-US" sz="1600" dirty="0">
+                <a:solidFill>
+                  <a:srgbClr val="2F2F2F"/>
+                </a:solidFill>
                 <a:latin typeface="Segoe UI Semibold"/>
               </a:rPr>
-              <a:t> and </a:t>
-            </a:r>
-            <a:r>
-              <a:rPr lang="en-US" sz="1600" dirty="0" err="1">
+              <a:t>using “before” of “after” location</a:t>
+            </a:r>
+            <a:r>
+              <a:rPr lang="en-US" sz="1600" dirty="0">
                 <a:solidFill>
                   <a:srgbClr val="2F2F2F"/>
                 </a:solidFill>
+                <a:latin typeface="Courier New" panose="02070309020205020404" pitchFamily="49" charset="0"/>
+                <a:cs typeface="Courier New" panose="02070309020205020404" pitchFamily="49" charset="0"/>
+              </a:rPr>
+              <a:t>)</a:t>
+            </a:r>
+            <a:r>
+              <a:rPr lang="en-US" sz="1600" dirty="0">
+                <a:solidFill>
+                  <a:srgbClr val="2F2F2F"/>
+                </a:solidFill>
                 <a:latin typeface="Segoe UI Semibold"/>
               </a:rPr>
-              <a:t>getPrevious</a:t>
-            </a:r>
-            <a:r>
-              <a:rPr lang="en-US" sz="1600" dirty="0">
-                <a:solidFill>
-                  <a:srgbClr val="2F2F2F"/>
-                </a:solidFill>
-                <a:latin typeface="Segoe UI Semibold"/>
-              </a:rPr>
-              <a:t> operations as well as when inserting a paragraph relative to self (using “before” of “after” location).</a:t>
+              <a:t>.</a:t>
             </a:r>
           </a:p>
         </p:txBody>

</xml_diff>